<commit_message>
Update main, main_class, Add audio, audio_class
Main & main_class basically finish
audio is prototype
also add testing environment (*_result)
</commit_message>
<xml_diff>
--- a/00_Document/00_development_process/PPT_FunctionSpecification_R00.pptx
+++ b/00_Document/00_development_process/PPT_FunctionSpecification_R00.pptx
@@ -4991,8 +4991,8 @@
     <dgm:cxn modelId="{F88B79F8-199C-4156-B804-50FA6D6DBF89}" type="presOf" srcId="{A9F4D88D-4132-4EAF-B724-9AA7085ED846}" destId="{A87A984C-6CFD-4577-959C-7E3FFD394C91}" srcOrd="0" destOrd="0" presId="urn:microsoft.com/office/officeart/2008/layout/NameandTitleOrganizationalChart"/>
     <dgm:cxn modelId="{6B3359CA-A9E1-4EC1-BBA9-AE993F19CEE8}" srcId="{839D0158-2D7A-439B-96A9-1BF3FE626DDC}" destId="{0B74BEE4-2FFC-4996-AF92-6CE7164FBD9A}" srcOrd="8" destOrd="0" parTransId="{E3496A37-7A15-4496-8852-4FCC727CF4FE}" sibTransId="{5BFC521A-6CDA-416E-BC9B-E6C28D4631DD}"/>
     <dgm:cxn modelId="{ABB8F577-DDCC-4152-B5AC-AE0BF3930BE2}" srcId="{839D0158-2D7A-439B-96A9-1BF3FE626DDC}" destId="{8831E232-1DDF-4F98-A671-873C040D256E}" srcOrd="3" destOrd="0" parTransId="{5993E7F5-AC4B-4F78-A6D1-6E6A5C300500}" sibTransId="{441787D9-1671-404B-ACD0-CF717B221097}"/>
+    <dgm:cxn modelId="{016AB22E-3384-470C-B42E-C5168C0941ED}" type="presOf" srcId="{9CAABF24-0288-48A9-9D16-D93236A22541}" destId="{924AB995-52E5-4691-B0B0-CD1C97DD046B}" srcOrd="0" destOrd="0" presId="urn:microsoft.com/office/officeart/2008/layout/NameandTitleOrganizationalChart"/>
     <dgm:cxn modelId="{5644385E-DB47-42C8-AF35-7EE20050C77D}" srcId="{839D0158-2D7A-439B-96A9-1BF3FE626DDC}" destId="{54D5FA36-A3D8-4678-ACD4-FE4D9BECE446}" srcOrd="5" destOrd="0" parTransId="{EF360562-5E1C-4A81-AF60-EBAEEE7278B6}" sibTransId="{BD5928DC-A586-4D52-A77B-27128F3B96B2}"/>
-    <dgm:cxn modelId="{016AB22E-3384-470C-B42E-C5168C0941ED}" type="presOf" srcId="{9CAABF24-0288-48A9-9D16-D93236A22541}" destId="{924AB995-52E5-4691-B0B0-CD1C97DD046B}" srcOrd="0" destOrd="0" presId="urn:microsoft.com/office/officeart/2008/layout/NameandTitleOrganizationalChart"/>
     <dgm:cxn modelId="{9DD5FDF6-261A-4B75-AE98-83976C13BD44}" type="presOf" srcId="{7B73A93D-1999-4910-A10B-4A7287EC5FD2}" destId="{DF81E026-8D62-4CFD-8127-7E01BB051911}" srcOrd="0" destOrd="0" presId="urn:microsoft.com/office/officeart/2008/layout/NameandTitleOrganizationalChart"/>
     <dgm:cxn modelId="{AB94E84C-23A3-4B56-850B-2206B2E84C05}" type="presOf" srcId="{6F5B298D-7679-40B4-9A1D-1B61326E82DE}" destId="{14D029E2-857D-44DD-8D05-298004F76829}" srcOrd="0" destOrd="0" presId="urn:microsoft.com/office/officeart/2008/layout/NameandTitleOrganizationalChart"/>
     <dgm:cxn modelId="{646E4872-2E37-44C0-8344-4E11E759E759}" type="presOf" srcId="{5BFC521A-6CDA-416E-BC9B-E6C28D4631DD}" destId="{E54940C6-58E8-4CBA-B778-765232A8B46F}" srcOrd="0" destOrd="0" presId="urn:microsoft.com/office/officeart/2008/layout/NameandTitleOrganizationalChart"/>
@@ -5334,13 +5334,8 @@
         <a:p>
           <a:r>
             <a:rPr lang="en-US" dirty="0" smtClean="0"/>
-            <a:t>Pi </a:t>
+            <a:t>Pi measures</a:t>
           </a:r>
-          <a:r>
-            <a:rPr lang="en-US" dirty="0" smtClean="0"/>
-            <a:t>measures</a:t>
-          </a:r>
-          <a:endParaRPr lang="en-US" dirty="0" smtClean="0"/>
         </a:p>
       </dgm:t>
     </dgm:pt>
@@ -5377,7 +5372,6 @@
             <a:rPr lang="en-US" dirty="0" smtClean="0"/>
             <a:t>Prepare outputs</a:t>
           </a:r>
-          <a:endParaRPr lang="en-US" dirty="0" smtClean="0"/>
         </a:p>
       </dgm:t>
     </dgm:pt>
@@ -5597,7 +5591,6 @@
             <a:rPr lang="en-US" dirty="0" smtClean="0"/>
             <a:t>Pi measures SpO2</a:t>
           </a:r>
-          <a:endParaRPr lang="en-US" dirty="0" smtClean="0"/>
         </a:p>
       </dgm:t>
     </dgm:pt>
@@ -5632,17 +5625,8 @@
         <a:p>
           <a:r>
             <a:rPr lang="en-US" dirty="0" smtClean="0"/>
-            <a:t>Get </a:t>
+            <a:t>Get blood pressure result</a:t>
           </a:r>
-          <a:r>
-            <a:rPr lang="en-US" dirty="0" smtClean="0"/>
-            <a:t>blood </a:t>
-          </a:r>
-          <a:r>
-            <a:rPr lang="en-US" dirty="0" smtClean="0"/>
-            <a:t>pressure result</a:t>
-          </a:r>
-          <a:endParaRPr lang="en-US" dirty="0" smtClean="0"/>
         </a:p>
       </dgm:t>
     </dgm:pt>
@@ -5679,7 +5663,6 @@
             <a:rPr lang="en-US" dirty="0" smtClean="0"/>
             <a:t>Scale</a:t>
           </a:r>
-          <a:endParaRPr lang="en-US" dirty="0" smtClean="0"/>
         </a:p>
       </dgm:t>
     </dgm:pt>
@@ -5716,7 +5699,6 @@
             <a:rPr lang="en-US" dirty="0" smtClean="0"/>
             <a:t>Temperature</a:t>
           </a:r>
-          <a:endParaRPr lang="en-US" dirty="0" smtClean="0"/>
         </a:p>
       </dgm:t>
     </dgm:pt>
@@ -5806,6 +5788,39 @@
       </dgm:t>
     </dgm:pt>
     <dgm:pt modelId="{631743A5-1AC9-4D0A-B8C1-BF03301D7154}" type="sibTrans" cxnId="{EF5C2330-6761-4CAD-96F8-71D82ACC91E2}">
+      <dgm:prSet/>
+      <dgm:spPr/>
+      <dgm:t>
+        <a:bodyPr/>
+        <a:lstStyle/>
+        <a:p>
+          <a:endParaRPr lang="en-US"/>
+        </a:p>
+      </dgm:t>
+    </dgm:pt>
+    <dgm:pt modelId="{22D37AD1-831C-40F0-8FB9-6F8698F28185}">
+      <dgm:prSet phldrT="[Text]"/>
+      <dgm:spPr/>
+      <dgm:t>
+        <a:bodyPr/>
+        <a:lstStyle/>
+        <a:p>
+          <a:endParaRPr lang="en-US" dirty="0" smtClean="0"/>
+        </a:p>
+      </dgm:t>
+    </dgm:pt>
+    <dgm:pt modelId="{A25D6232-A6E1-4103-AEFA-7192B95A97C0}" type="parTrans" cxnId="{E5C7CD86-EC86-4052-8490-293639201F0A}">
+      <dgm:prSet/>
+      <dgm:spPr/>
+      <dgm:t>
+        <a:bodyPr/>
+        <a:lstStyle/>
+        <a:p>
+          <a:endParaRPr lang="en-US"/>
+        </a:p>
+      </dgm:t>
+    </dgm:pt>
+    <dgm:pt modelId="{F7E4BF3C-DD43-4FBE-8890-CB2C899CFBEE}" type="sibTrans" cxnId="{E5C7CD86-EC86-4052-8490-293639201F0A}">
       <dgm:prSet/>
       <dgm:spPr/>
       <dgm:t>
@@ -5833,7 +5848,7 @@
       </dgm:t>
     </dgm:pt>
     <dgm:pt modelId="{3AD5559E-BD30-4C5E-8244-E975DFD4D66A}" type="pres">
-      <dgm:prSet presAssocID="{4B69B0E3-8743-4939-B11F-528463168E2A}" presName="node" presStyleLbl="node1" presStyleIdx="0" presStyleCnt="12">
+      <dgm:prSet presAssocID="{4B69B0E3-8743-4939-B11F-528463168E2A}" presName="node" presStyleLbl="node1" presStyleIdx="0" presStyleCnt="11">
         <dgm:presLayoutVars>
           <dgm:bulletEnabled val="1"/>
         </dgm:presLayoutVars>
@@ -5848,7 +5863,7 @@
       </dgm:t>
     </dgm:pt>
     <dgm:pt modelId="{7E7752DD-DCDB-41B0-B094-2281FBAA8726}" type="pres">
-      <dgm:prSet presAssocID="{CC576BF7-D0C4-45C0-8742-81D00CDE3EDA}" presName="sibTrans" presStyleLbl="sibTrans2D1" presStyleIdx="0" presStyleCnt="11"/>
+      <dgm:prSet presAssocID="{CC576BF7-D0C4-45C0-8742-81D00CDE3EDA}" presName="sibTrans" presStyleLbl="sibTrans2D1" presStyleIdx="0" presStyleCnt="10"/>
       <dgm:spPr/>
       <dgm:t>
         <a:bodyPr/>
@@ -5859,7 +5874,7 @@
       </dgm:t>
     </dgm:pt>
     <dgm:pt modelId="{AE9BFCD7-65E9-4042-93B3-00254295DFC1}" type="pres">
-      <dgm:prSet presAssocID="{CC576BF7-D0C4-45C0-8742-81D00CDE3EDA}" presName="connectorText" presStyleLbl="sibTrans2D1" presStyleIdx="0" presStyleCnt="11"/>
+      <dgm:prSet presAssocID="{CC576BF7-D0C4-45C0-8742-81D00CDE3EDA}" presName="connectorText" presStyleLbl="sibTrans2D1" presStyleIdx="0" presStyleCnt="10"/>
       <dgm:spPr/>
       <dgm:t>
         <a:bodyPr/>
@@ -5870,7 +5885,7 @@
       </dgm:t>
     </dgm:pt>
     <dgm:pt modelId="{C552C226-DCF4-4C0B-9226-C4DC76870D11}" type="pres">
-      <dgm:prSet presAssocID="{11759023-B539-4A9D-9148-695A907123CF}" presName="node" presStyleLbl="node1" presStyleIdx="1" presStyleCnt="12">
+      <dgm:prSet presAssocID="{11759023-B539-4A9D-9148-695A907123CF}" presName="node" presStyleLbl="node1" presStyleIdx="1" presStyleCnt="11">
         <dgm:presLayoutVars>
           <dgm:bulletEnabled val="1"/>
         </dgm:presLayoutVars>
@@ -5885,15 +5900,29 @@
       </dgm:t>
     </dgm:pt>
     <dgm:pt modelId="{4E482C98-6EFA-4C20-AE49-96BEB2724FA0}" type="pres">
-      <dgm:prSet presAssocID="{B49C4D2D-FBEB-4D1C-B75F-C3DE01451527}" presName="sibTrans" presStyleLbl="sibTrans2D1" presStyleIdx="1" presStyleCnt="11"/>
-      <dgm:spPr/>
+      <dgm:prSet presAssocID="{B49C4D2D-FBEB-4D1C-B75F-C3DE01451527}" presName="sibTrans" presStyleLbl="sibTrans2D1" presStyleIdx="1" presStyleCnt="10"/>
+      <dgm:spPr/>
+      <dgm:t>
+        <a:bodyPr/>
+        <a:lstStyle/>
+        <a:p>
+          <a:endParaRPr lang="en-US"/>
+        </a:p>
+      </dgm:t>
     </dgm:pt>
     <dgm:pt modelId="{B7AFCB0A-375A-421B-BDCD-3F97A815491D}" type="pres">
-      <dgm:prSet presAssocID="{B49C4D2D-FBEB-4D1C-B75F-C3DE01451527}" presName="connectorText" presStyleLbl="sibTrans2D1" presStyleIdx="1" presStyleCnt="11"/>
-      <dgm:spPr/>
+      <dgm:prSet presAssocID="{B49C4D2D-FBEB-4D1C-B75F-C3DE01451527}" presName="connectorText" presStyleLbl="sibTrans2D1" presStyleIdx="1" presStyleCnt="10"/>
+      <dgm:spPr/>
+      <dgm:t>
+        <a:bodyPr/>
+        <a:lstStyle/>
+        <a:p>
+          <a:endParaRPr lang="en-US"/>
+        </a:p>
+      </dgm:t>
     </dgm:pt>
     <dgm:pt modelId="{B6F5FD8B-2420-4FD2-A968-06EB999D45F8}" type="pres">
-      <dgm:prSet presAssocID="{3D9A5FDC-149F-4871-AC0B-41FE9D85C64C}" presName="node" presStyleLbl="node1" presStyleIdx="2" presStyleCnt="12">
+      <dgm:prSet presAssocID="{3D9A5FDC-149F-4871-AC0B-41FE9D85C64C}" presName="node" presStyleLbl="node1" presStyleIdx="2" presStyleCnt="11">
         <dgm:presLayoutVars>
           <dgm:bulletEnabled val="1"/>
         </dgm:presLayoutVars>
@@ -5908,15 +5937,29 @@
       </dgm:t>
     </dgm:pt>
     <dgm:pt modelId="{FE02FC1D-D3EB-4076-A80F-B80B5AAC7ABB}" type="pres">
-      <dgm:prSet presAssocID="{252A868E-1D7A-4BD9-B234-19B2E62E0B3A}" presName="sibTrans" presStyleLbl="sibTrans2D1" presStyleIdx="2" presStyleCnt="11"/>
-      <dgm:spPr/>
+      <dgm:prSet presAssocID="{252A868E-1D7A-4BD9-B234-19B2E62E0B3A}" presName="sibTrans" presStyleLbl="sibTrans2D1" presStyleIdx="2" presStyleCnt="10"/>
+      <dgm:spPr/>
+      <dgm:t>
+        <a:bodyPr/>
+        <a:lstStyle/>
+        <a:p>
+          <a:endParaRPr lang="en-US"/>
+        </a:p>
+      </dgm:t>
     </dgm:pt>
     <dgm:pt modelId="{425C393F-DC73-4F76-B412-3A9100D3169A}" type="pres">
-      <dgm:prSet presAssocID="{252A868E-1D7A-4BD9-B234-19B2E62E0B3A}" presName="connectorText" presStyleLbl="sibTrans2D1" presStyleIdx="2" presStyleCnt="11"/>
-      <dgm:spPr/>
+      <dgm:prSet presAssocID="{252A868E-1D7A-4BD9-B234-19B2E62E0B3A}" presName="connectorText" presStyleLbl="sibTrans2D1" presStyleIdx="2" presStyleCnt="10"/>
+      <dgm:spPr/>
+      <dgm:t>
+        <a:bodyPr/>
+        <a:lstStyle/>
+        <a:p>
+          <a:endParaRPr lang="en-US"/>
+        </a:p>
+      </dgm:t>
     </dgm:pt>
     <dgm:pt modelId="{0631316F-807F-4C68-B220-03577B1939F8}" type="pres">
-      <dgm:prSet presAssocID="{E0D73B0D-2B54-4BB7-837B-A02C9C860C3A}" presName="node" presStyleLbl="node1" presStyleIdx="3" presStyleCnt="12">
+      <dgm:prSet presAssocID="{E0D73B0D-2B54-4BB7-837B-A02C9C860C3A}" presName="node" presStyleLbl="node1" presStyleIdx="3" presStyleCnt="11">
         <dgm:presLayoutVars>
           <dgm:bulletEnabled val="1"/>
         </dgm:presLayoutVars>
@@ -5931,15 +5974,29 @@
       </dgm:t>
     </dgm:pt>
     <dgm:pt modelId="{9FEB6EAB-4890-41DE-90EE-B031032C219C}" type="pres">
-      <dgm:prSet presAssocID="{E0319071-DA33-4CEE-AEED-77BDB96D497A}" presName="sibTrans" presStyleLbl="sibTrans2D1" presStyleIdx="3" presStyleCnt="11"/>
-      <dgm:spPr/>
+      <dgm:prSet presAssocID="{E0319071-DA33-4CEE-AEED-77BDB96D497A}" presName="sibTrans" presStyleLbl="sibTrans2D1" presStyleIdx="3" presStyleCnt="10"/>
+      <dgm:spPr/>
+      <dgm:t>
+        <a:bodyPr/>
+        <a:lstStyle/>
+        <a:p>
+          <a:endParaRPr lang="en-US"/>
+        </a:p>
+      </dgm:t>
     </dgm:pt>
     <dgm:pt modelId="{B3D31688-DAC1-45E7-8B67-DB84E8ED7C7F}" type="pres">
-      <dgm:prSet presAssocID="{E0319071-DA33-4CEE-AEED-77BDB96D497A}" presName="connectorText" presStyleLbl="sibTrans2D1" presStyleIdx="3" presStyleCnt="11"/>
-      <dgm:spPr/>
+      <dgm:prSet presAssocID="{E0319071-DA33-4CEE-AEED-77BDB96D497A}" presName="connectorText" presStyleLbl="sibTrans2D1" presStyleIdx="3" presStyleCnt="10"/>
+      <dgm:spPr/>
+      <dgm:t>
+        <a:bodyPr/>
+        <a:lstStyle/>
+        <a:p>
+          <a:endParaRPr lang="en-US"/>
+        </a:p>
+      </dgm:t>
     </dgm:pt>
     <dgm:pt modelId="{9DCBE7C4-77E3-4D84-882B-7F8484E636DC}" type="pres">
-      <dgm:prSet presAssocID="{2F8C4D08-CEAE-4B58-A0D0-64795F5C59C7}" presName="node" presStyleLbl="node1" presStyleIdx="4" presStyleCnt="12">
+      <dgm:prSet presAssocID="{2F8C4D08-CEAE-4B58-A0D0-64795F5C59C7}" presName="node" presStyleLbl="node1" presStyleIdx="4" presStyleCnt="11">
         <dgm:presLayoutVars>
           <dgm:bulletEnabled val="1"/>
         </dgm:presLayoutVars>
@@ -5954,7 +6011,7 @@
       </dgm:t>
     </dgm:pt>
     <dgm:pt modelId="{B96C6DDC-F963-4B90-A0A4-7D9FCD4D5E46}" type="pres">
-      <dgm:prSet presAssocID="{82FE3047-50CF-40C0-939B-38F880054397}" presName="sibTrans" presStyleLbl="sibTrans2D1" presStyleIdx="4" presStyleCnt="11"/>
+      <dgm:prSet presAssocID="{82FE3047-50CF-40C0-939B-38F880054397}" presName="sibTrans" presStyleLbl="sibTrans2D1" presStyleIdx="4" presStyleCnt="10"/>
       <dgm:spPr/>
       <dgm:t>
         <a:bodyPr/>
@@ -5965,7 +6022,7 @@
       </dgm:t>
     </dgm:pt>
     <dgm:pt modelId="{0448F131-E2C7-4E83-90A6-258E21432E6A}" type="pres">
-      <dgm:prSet presAssocID="{82FE3047-50CF-40C0-939B-38F880054397}" presName="connectorText" presStyleLbl="sibTrans2D1" presStyleIdx="4" presStyleCnt="11"/>
+      <dgm:prSet presAssocID="{82FE3047-50CF-40C0-939B-38F880054397}" presName="connectorText" presStyleLbl="sibTrans2D1" presStyleIdx="4" presStyleCnt="10"/>
       <dgm:spPr/>
       <dgm:t>
         <a:bodyPr/>
@@ -5975,8 +6032,8 @@
         </a:p>
       </dgm:t>
     </dgm:pt>
-    <dgm:pt modelId="{6BFB2FC8-D0D9-4EF7-88E7-53C32EB04ED2}" type="pres">
-      <dgm:prSet presAssocID="{6079760F-3BEB-448E-8C4C-D07379A5E46D}" presName="node" presStyleLbl="node1" presStyleIdx="5" presStyleCnt="12">
+    <dgm:pt modelId="{9038EBA2-D570-4040-AD91-DE80216ABD27}" type="pres">
+      <dgm:prSet presAssocID="{22D37AD1-831C-40F0-8FB9-6F8698F28185}" presName="node" presStyleLbl="node1" presStyleIdx="5" presStyleCnt="11">
         <dgm:presLayoutVars>
           <dgm:bulletEnabled val="1"/>
         </dgm:presLayoutVars>
@@ -5990,30 +6047,16 @@
         </a:p>
       </dgm:t>
     </dgm:pt>
-    <dgm:pt modelId="{0795C1ED-6176-4D71-8695-BFA260CD8DB5}" type="pres">
-      <dgm:prSet presAssocID="{64943D96-19D2-4F2F-AB9D-7FACCD83237E}" presName="sibTrans" presStyleLbl="sibTrans2D1" presStyleIdx="5" presStyleCnt="11"/>
-      <dgm:spPr/>
-      <dgm:t>
-        <a:bodyPr/>
-        <a:lstStyle/>
-        <a:p>
-          <a:endParaRPr lang="en-US"/>
-        </a:p>
-      </dgm:t>
-    </dgm:pt>
-    <dgm:pt modelId="{E4600BEF-D57A-4645-A92E-7E96936C5191}" type="pres">
-      <dgm:prSet presAssocID="{64943D96-19D2-4F2F-AB9D-7FACCD83237E}" presName="connectorText" presStyleLbl="sibTrans2D1" presStyleIdx="5" presStyleCnt="11"/>
-      <dgm:spPr/>
-      <dgm:t>
-        <a:bodyPr/>
-        <a:lstStyle/>
-        <a:p>
-          <a:endParaRPr lang="en-US"/>
-        </a:p>
-      </dgm:t>
-    </dgm:pt>
-    <dgm:pt modelId="{7202BC0E-BCCD-4749-B8AE-EAEB96710794}" type="pres">
-      <dgm:prSet presAssocID="{E7A50803-F364-4CD4-AD78-41B1FBFF1BA8}" presName="node" presStyleLbl="node1" presStyleIdx="6" presStyleCnt="12">
+    <dgm:pt modelId="{604B6F34-710D-40C8-8805-5FC71845512E}" type="pres">
+      <dgm:prSet presAssocID="{F7E4BF3C-DD43-4FBE-8890-CB2C899CFBEE}" presName="sibTrans" presStyleLbl="sibTrans2D1" presStyleIdx="5" presStyleCnt="10"/>
+      <dgm:spPr/>
+    </dgm:pt>
+    <dgm:pt modelId="{5573A9C5-32E3-4FB7-A8A8-AA74B345325A}" type="pres">
+      <dgm:prSet presAssocID="{F7E4BF3C-DD43-4FBE-8890-CB2C899CFBEE}" presName="connectorText" presStyleLbl="sibTrans2D1" presStyleIdx="5" presStyleCnt="10"/>
+      <dgm:spPr/>
+    </dgm:pt>
+    <dgm:pt modelId="{99A2F953-EC43-4E7D-895E-E6CCB05BF9AC}" type="pres">
+      <dgm:prSet presAssocID="{F6634B8D-E0A8-4CF8-9547-DC651A569B35}" presName="node" presStyleLbl="node1" presStyleIdx="6" presStyleCnt="11">
         <dgm:presLayoutVars>
           <dgm:bulletEnabled val="1"/>
         </dgm:presLayoutVars>
@@ -6027,8 +6070,8 @@
         </a:p>
       </dgm:t>
     </dgm:pt>
-    <dgm:pt modelId="{28D40CE1-835B-4A7B-8244-943B63DB6594}" type="pres">
-      <dgm:prSet presAssocID="{DA4329DA-20FA-4C38-857D-B35ED56ACC55}" presName="sibTrans" presStyleLbl="sibTrans2D1" presStyleIdx="6" presStyleCnt="11"/>
+    <dgm:pt modelId="{B0605081-2CC9-4157-A707-056A7E67F165}" type="pres">
+      <dgm:prSet presAssocID="{0A0E999D-969B-45C8-AFE8-AA11F26815D4}" presName="sibTrans" presStyleLbl="sibTrans2D1" presStyleIdx="6" presStyleCnt="10"/>
       <dgm:spPr/>
       <dgm:t>
         <a:bodyPr/>
@@ -6038,8 +6081,8 @@
         </a:p>
       </dgm:t>
     </dgm:pt>
-    <dgm:pt modelId="{4BC23CEC-7E80-4DB3-84E2-974D7F887BA4}" type="pres">
-      <dgm:prSet presAssocID="{DA4329DA-20FA-4C38-857D-B35ED56ACC55}" presName="connectorText" presStyleLbl="sibTrans2D1" presStyleIdx="6" presStyleCnt="11"/>
+    <dgm:pt modelId="{6C3D7124-8CE6-43EF-B903-996C1AE4DCA8}" type="pres">
+      <dgm:prSet presAssocID="{0A0E999D-969B-45C8-AFE8-AA11F26815D4}" presName="connectorText" presStyleLbl="sibTrans2D1" presStyleIdx="6" presStyleCnt="10"/>
       <dgm:spPr/>
       <dgm:t>
         <a:bodyPr/>
@@ -6049,8 +6092,8 @@
         </a:p>
       </dgm:t>
     </dgm:pt>
-    <dgm:pt modelId="{99A2F953-EC43-4E7D-895E-E6CCB05BF9AC}" type="pres">
-      <dgm:prSet presAssocID="{F6634B8D-E0A8-4CF8-9547-DC651A569B35}" presName="node" presStyleLbl="node1" presStyleIdx="7" presStyleCnt="12">
+    <dgm:pt modelId="{56040DE5-8429-4ADC-872E-25108EC0DBDB}" type="pres">
+      <dgm:prSet presAssocID="{798A6FF1-55B3-448B-9510-4CF912534081}" presName="node" presStyleLbl="node1" presStyleIdx="7" presStyleCnt="11">
         <dgm:presLayoutVars>
           <dgm:bulletEnabled val="1"/>
         </dgm:presLayoutVars>
@@ -6064,16 +6107,30 @@
         </a:p>
       </dgm:t>
     </dgm:pt>
-    <dgm:pt modelId="{B0605081-2CC9-4157-A707-056A7E67F165}" type="pres">
-      <dgm:prSet presAssocID="{0A0E999D-969B-45C8-AFE8-AA11F26815D4}" presName="sibTrans" presStyleLbl="sibTrans2D1" presStyleIdx="7" presStyleCnt="11"/>
-      <dgm:spPr/>
-    </dgm:pt>
-    <dgm:pt modelId="{6C3D7124-8CE6-43EF-B903-996C1AE4DCA8}" type="pres">
-      <dgm:prSet presAssocID="{0A0E999D-969B-45C8-AFE8-AA11F26815D4}" presName="connectorText" presStyleLbl="sibTrans2D1" presStyleIdx="7" presStyleCnt="11"/>
-      <dgm:spPr/>
-    </dgm:pt>
-    <dgm:pt modelId="{56040DE5-8429-4ADC-872E-25108EC0DBDB}" type="pres">
-      <dgm:prSet presAssocID="{798A6FF1-55B3-448B-9510-4CF912534081}" presName="node" presStyleLbl="node1" presStyleIdx="8" presStyleCnt="12">
+    <dgm:pt modelId="{8875B72C-833D-4C06-88C7-8621517377BC}" type="pres">
+      <dgm:prSet presAssocID="{84C407B1-5E4A-476A-B92D-CCF3FF3AAA46}" presName="sibTrans" presStyleLbl="sibTrans2D1" presStyleIdx="7" presStyleCnt="10"/>
+      <dgm:spPr/>
+      <dgm:t>
+        <a:bodyPr/>
+        <a:lstStyle/>
+        <a:p>
+          <a:endParaRPr lang="en-US"/>
+        </a:p>
+      </dgm:t>
+    </dgm:pt>
+    <dgm:pt modelId="{6FC24B80-D800-4BB8-8862-1A8D3268A0E7}" type="pres">
+      <dgm:prSet presAssocID="{84C407B1-5E4A-476A-B92D-CCF3FF3AAA46}" presName="connectorText" presStyleLbl="sibTrans2D1" presStyleIdx="7" presStyleCnt="10"/>
+      <dgm:spPr/>
+      <dgm:t>
+        <a:bodyPr/>
+        <a:lstStyle/>
+        <a:p>
+          <a:endParaRPr lang="en-US"/>
+        </a:p>
+      </dgm:t>
+    </dgm:pt>
+    <dgm:pt modelId="{202B8E42-56EC-4F6F-B287-6BFE3E8911D1}" type="pres">
+      <dgm:prSet presAssocID="{4F55A451-EEAC-4794-AD1A-88C08A1F61E7}" presName="node" presStyleLbl="node1" presStyleIdx="8" presStyleCnt="11">
         <dgm:presLayoutVars>
           <dgm:bulletEnabled val="1"/>
         </dgm:presLayoutVars>
@@ -6087,16 +6144,30 @@
         </a:p>
       </dgm:t>
     </dgm:pt>
-    <dgm:pt modelId="{8875B72C-833D-4C06-88C7-8621517377BC}" type="pres">
-      <dgm:prSet presAssocID="{84C407B1-5E4A-476A-B92D-CCF3FF3AAA46}" presName="sibTrans" presStyleLbl="sibTrans2D1" presStyleIdx="8" presStyleCnt="11"/>
-      <dgm:spPr/>
-    </dgm:pt>
-    <dgm:pt modelId="{6FC24B80-D800-4BB8-8862-1A8D3268A0E7}" type="pres">
-      <dgm:prSet presAssocID="{84C407B1-5E4A-476A-B92D-CCF3FF3AAA46}" presName="connectorText" presStyleLbl="sibTrans2D1" presStyleIdx="8" presStyleCnt="11"/>
-      <dgm:spPr/>
-    </dgm:pt>
-    <dgm:pt modelId="{202B8E42-56EC-4F6F-B287-6BFE3E8911D1}" type="pres">
-      <dgm:prSet presAssocID="{4F55A451-EEAC-4794-AD1A-88C08A1F61E7}" presName="node" presStyleLbl="node1" presStyleIdx="9" presStyleCnt="12">
+    <dgm:pt modelId="{F5157131-9131-47E0-91C7-C2708EA7DF4E}" type="pres">
+      <dgm:prSet presAssocID="{7A900D74-D999-4C0D-903D-9385AF28B32A}" presName="sibTrans" presStyleLbl="sibTrans2D1" presStyleIdx="8" presStyleCnt="10"/>
+      <dgm:spPr/>
+      <dgm:t>
+        <a:bodyPr/>
+        <a:lstStyle/>
+        <a:p>
+          <a:endParaRPr lang="en-US"/>
+        </a:p>
+      </dgm:t>
+    </dgm:pt>
+    <dgm:pt modelId="{FA657519-C910-4034-B3AB-F451068D97BB}" type="pres">
+      <dgm:prSet presAssocID="{7A900D74-D999-4C0D-903D-9385AF28B32A}" presName="connectorText" presStyleLbl="sibTrans2D1" presStyleIdx="8" presStyleCnt="10"/>
+      <dgm:spPr/>
+      <dgm:t>
+        <a:bodyPr/>
+        <a:lstStyle/>
+        <a:p>
+          <a:endParaRPr lang="en-US"/>
+        </a:p>
+      </dgm:t>
+    </dgm:pt>
+    <dgm:pt modelId="{89DADE2F-0EC1-44A0-92D9-021DF56E312B}" type="pres">
+      <dgm:prSet presAssocID="{7C7B550B-1B4D-42E2-ACFC-728546073CB1}" presName="node" presStyleLbl="node1" presStyleIdx="9" presStyleCnt="11">
         <dgm:presLayoutVars>
           <dgm:bulletEnabled val="1"/>
         </dgm:presLayoutVars>
@@ -6110,8 +6181,8 @@
         </a:p>
       </dgm:t>
     </dgm:pt>
-    <dgm:pt modelId="{F5157131-9131-47E0-91C7-C2708EA7DF4E}" type="pres">
-      <dgm:prSet presAssocID="{7A900D74-D999-4C0D-903D-9385AF28B32A}" presName="sibTrans" presStyleLbl="sibTrans2D1" presStyleIdx="9" presStyleCnt="11"/>
+    <dgm:pt modelId="{CD0FEDB8-BCC7-4F7B-BCF9-F14D929D684E}" type="pres">
+      <dgm:prSet presAssocID="{645BB4AE-23C8-4363-BE6C-2366BFD3FAE5}" presName="sibTrans" presStyleLbl="sibTrans2D1" presStyleIdx="9" presStyleCnt="10"/>
       <dgm:spPr/>
       <dgm:t>
         <a:bodyPr/>
@@ -6121,8 +6192,8 @@
         </a:p>
       </dgm:t>
     </dgm:pt>
-    <dgm:pt modelId="{FA657519-C910-4034-B3AB-F451068D97BB}" type="pres">
-      <dgm:prSet presAssocID="{7A900D74-D999-4C0D-903D-9385AF28B32A}" presName="connectorText" presStyleLbl="sibTrans2D1" presStyleIdx="9" presStyleCnt="11"/>
+    <dgm:pt modelId="{427AD9CF-C940-4EE9-9DB4-80E286518A29}" type="pres">
+      <dgm:prSet presAssocID="{645BB4AE-23C8-4363-BE6C-2366BFD3FAE5}" presName="connectorText" presStyleLbl="sibTrans2D1" presStyleIdx="9" presStyleCnt="10"/>
       <dgm:spPr/>
       <dgm:t>
         <a:bodyPr/>
@@ -6132,8 +6203,8 @@
         </a:p>
       </dgm:t>
     </dgm:pt>
-    <dgm:pt modelId="{89DADE2F-0EC1-44A0-92D9-021DF56E312B}" type="pres">
-      <dgm:prSet presAssocID="{7C7B550B-1B4D-42E2-ACFC-728546073CB1}" presName="node" presStyleLbl="node1" presStyleIdx="10" presStyleCnt="12">
+    <dgm:pt modelId="{C269A2E3-8621-4697-96C7-19DDAF8DBEF2}" type="pres">
+      <dgm:prSet presAssocID="{C385F31E-C6F1-41EB-A744-6A3BF2E406F6}" presName="node" presStyleLbl="node1" presStyleIdx="10" presStyleCnt="11">
         <dgm:presLayoutVars>
           <dgm:bulletEnabled val="1"/>
         </dgm:presLayoutVars>
@@ -6147,100 +6218,63 @@
         </a:p>
       </dgm:t>
     </dgm:pt>
-    <dgm:pt modelId="{CD0FEDB8-BCC7-4F7B-BCF9-F14D929D684E}" type="pres">
-      <dgm:prSet presAssocID="{645BB4AE-23C8-4363-BE6C-2366BFD3FAE5}" presName="sibTrans" presStyleLbl="sibTrans2D1" presStyleIdx="10" presStyleCnt="11"/>
-      <dgm:spPr/>
-      <dgm:t>
-        <a:bodyPr/>
-        <a:lstStyle/>
-        <a:p>
-          <a:endParaRPr lang="en-US"/>
-        </a:p>
-      </dgm:t>
-    </dgm:pt>
-    <dgm:pt modelId="{427AD9CF-C940-4EE9-9DB4-80E286518A29}" type="pres">
-      <dgm:prSet presAssocID="{645BB4AE-23C8-4363-BE6C-2366BFD3FAE5}" presName="connectorText" presStyleLbl="sibTrans2D1" presStyleIdx="10" presStyleCnt="11"/>
-      <dgm:spPr/>
-      <dgm:t>
-        <a:bodyPr/>
-        <a:lstStyle/>
-        <a:p>
-          <a:endParaRPr lang="en-US"/>
-        </a:p>
-      </dgm:t>
-    </dgm:pt>
-    <dgm:pt modelId="{C269A2E3-8621-4697-96C7-19DDAF8DBEF2}" type="pres">
-      <dgm:prSet presAssocID="{C385F31E-C6F1-41EB-A744-6A3BF2E406F6}" presName="node" presStyleLbl="node1" presStyleIdx="11" presStyleCnt="12">
-        <dgm:presLayoutVars>
-          <dgm:bulletEnabled val="1"/>
-        </dgm:presLayoutVars>
-      </dgm:prSet>
-      <dgm:spPr/>
-      <dgm:t>
-        <a:bodyPr/>
-        <a:lstStyle/>
-        <a:p>
-          <a:endParaRPr lang="en-US"/>
-        </a:p>
-      </dgm:t>
-    </dgm:pt>
   </dgm:ptLst>
   <dgm:cxnLst>
-    <dgm:cxn modelId="{8D3E1448-D30F-46E4-88BA-A5A85580627D}" type="presOf" srcId="{2F8C4D08-CEAE-4B58-A0D0-64795F5C59C7}" destId="{9DCBE7C4-77E3-4D84-882B-7F8484E636DC}" srcOrd="0" destOrd="0" presId="urn:microsoft.com/office/officeart/2005/8/layout/process5"/>
-    <dgm:cxn modelId="{D0D07ECF-4D3D-4124-9387-4AEF720B7401}" type="presOf" srcId="{6079760F-3BEB-448E-8C4C-D07379A5E46D}" destId="{6BFB2FC8-D0D9-4EF7-88E7-53C32EB04ED2}" srcOrd="0" destOrd="0" presId="urn:microsoft.com/office/officeart/2005/8/layout/process5"/>
-    <dgm:cxn modelId="{36375326-BE41-4699-AA2A-CF8DF5938E42}" type="presOf" srcId="{C385F31E-C6F1-41EB-A744-6A3BF2E406F6}" destId="{C269A2E3-8621-4697-96C7-19DDAF8DBEF2}" srcOrd="0" destOrd="0" presId="urn:microsoft.com/office/officeart/2005/8/layout/process5"/>
+    <dgm:cxn modelId="{DB0B18EC-FCB6-4AE2-8D02-2CC9FC63F21C}" type="presOf" srcId="{84C407B1-5E4A-476A-B92D-CCF3FF3AAA46}" destId="{8875B72C-833D-4C06-88C7-8621517377BC}" srcOrd="0" destOrd="0" presId="urn:microsoft.com/office/officeart/2005/8/layout/process5"/>
+    <dgm:cxn modelId="{0DD00EE7-B9D6-49DA-BAB7-2D58B6D259CF}" type="presOf" srcId="{6079760F-3BEB-448E-8C4C-D07379A5E46D}" destId="{9038EBA2-D570-4040-AD91-DE80216ABD27}" srcOrd="0" destOrd="1" presId="urn:microsoft.com/office/officeart/2005/8/layout/process5"/>
+    <dgm:cxn modelId="{14580366-1FBC-4C21-8C8C-ECCEFC03B8D9}" srcId="{2EB99E6E-DD2C-44A8-96E3-DAEB06EBC057}" destId="{C385F31E-C6F1-41EB-A744-6A3BF2E406F6}" srcOrd="10" destOrd="0" parTransId="{D43C4031-2516-4EC0-BAAF-D4081E65232B}" sibTransId="{4B6C20F8-6B52-45DF-9F97-26B7A319589B}"/>
+    <dgm:cxn modelId="{1206516C-55F3-49A0-A66D-800032056FEF}" type="presOf" srcId="{3D9A5FDC-149F-4871-AC0B-41FE9D85C64C}" destId="{B6F5FD8B-2420-4FD2-A968-06EB999D45F8}" srcOrd="0" destOrd="0" presId="urn:microsoft.com/office/officeart/2005/8/layout/process5"/>
+    <dgm:cxn modelId="{5820A6EF-4FC6-431B-AD2F-DCD004992DA4}" type="presOf" srcId="{11759023-B539-4A9D-9148-695A907123CF}" destId="{C552C226-DCF4-4C0B-9226-C4DC76870D11}" srcOrd="0" destOrd="0" presId="urn:microsoft.com/office/officeart/2005/8/layout/process5"/>
+    <dgm:cxn modelId="{C9D9C90E-4623-4921-81B9-E98F68171228}" type="presOf" srcId="{C7808C6A-1DE8-43E2-A730-B64DDB015688}" destId="{C552C226-DCF4-4C0B-9226-C4DC76870D11}" srcOrd="0" destOrd="1" presId="urn:microsoft.com/office/officeart/2005/8/layout/process5"/>
+    <dgm:cxn modelId="{9A4536DF-DA56-497F-A81B-7850E8220D4B}" srcId="{E7A50803-F364-4CD4-AD78-41B1FBFF1BA8}" destId="{0D096DC1-5A8B-4ADE-A057-0F5D5950C77F}" srcOrd="1" destOrd="0" parTransId="{3B29BF6D-8309-45FC-BAB5-34109509ECCA}" sibTransId="{AF508A93-BE0D-45D4-93D1-F78FB8325E97}"/>
+    <dgm:cxn modelId="{1A321DBF-BEC3-46BE-A3EB-5EA08D0916E6}" type="presOf" srcId="{E7A50803-F364-4CD4-AD78-41B1FBFF1BA8}" destId="{9038EBA2-D570-4040-AD91-DE80216ABD27}" srcOrd="0" destOrd="2" presId="urn:microsoft.com/office/officeart/2005/8/layout/process5"/>
+    <dgm:cxn modelId="{EF5C2330-6761-4CAD-96F8-71D82ACC91E2}" srcId="{11759023-B539-4A9D-9148-695A907123CF}" destId="{F2C8586D-E9EC-49DE-A6E1-7395CCE564B6}" srcOrd="1" destOrd="0" parTransId="{A79A6D4F-3843-4AB0-A812-5BD82272AA28}" sibTransId="{631743A5-1AC9-4D0A-B8C1-BF03301D7154}"/>
+    <dgm:cxn modelId="{25F3AEA8-686B-48D8-97BC-DCBF531305D5}" type="presOf" srcId="{0D096DC1-5A8B-4ADE-A057-0F5D5950C77F}" destId="{9038EBA2-D570-4040-AD91-DE80216ABD27}" srcOrd="0" destOrd="4" presId="urn:microsoft.com/office/officeart/2005/8/layout/process5"/>
+    <dgm:cxn modelId="{1A1864AA-6C88-4A72-A88A-383848E48098}" srcId="{2EB99E6E-DD2C-44A8-96E3-DAEB06EBC057}" destId="{11759023-B539-4A9D-9148-695A907123CF}" srcOrd="1" destOrd="0" parTransId="{CB27E4A7-A152-416A-AE74-8BAADA362E30}" sibTransId="{B49C4D2D-FBEB-4D1C-B75F-C3DE01451527}"/>
+    <dgm:cxn modelId="{00BFEED2-4380-4B91-BE00-4AB756214262}" type="presOf" srcId="{4B69B0E3-8743-4939-B11F-528463168E2A}" destId="{3AD5559E-BD30-4C5E-8244-E975DFD4D66A}" srcOrd="0" destOrd="0" presId="urn:microsoft.com/office/officeart/2005/8/layout/process5"/>
     <dgm:cxn modelId="{16044BBF-FDB1-4A67-B668-E257BEB1AE15}" type="presOf" srcId="{645BB4AE-23C8-4363-BE6C-2366BFD3FAE5}" destId="{CD0FEDB8-BCC7-4F7B-BCF9-F14D929D684E}" srcOrd="0" destOrd="0" presId="urn:microsoft.com/office/officeart/2005/8/layout/process5"/>
-    <dgm:cxn modelId="{1206516C-55F3-49A0-A66D-800032056FEF}" type="presOf" srcId="{3D9A5FDC-149F-4871-AC0B-41FE9D85C64C}" destId="{B6F5FD8B-2420-4FD2-A968-06EB999D45F8}" srcOrd="0" destOrd="0" presId="urn:microsoft.com/office/officeart/2005/8/layout/process5"/>
-    <dgm:cxn modelId="{40EF2476-88D6-4D65-A834-7B8200D87526}" srcId="{2EB99E6E-DD2C-44A8-96E3-DAEB06EBC057}" destId="{E7A50803-F364-4CD4-AD78-41B1FBFF1BA8}" srcOrd="6" destOrd="0" parTransId="{407CD609-00D6-48E0-AA13-550B24BE3F19}" sibTransId="{DA4329DA-20FA-4C38-857D-B35ED56ACC55}"/>
-    <dgm:cxn modelId="{06C594FE-5AFA-48DB-8E09-4DE0E4DD2E92}" type="presOf" srcId="{4F55A451-EEAC-4794-AD1A-88C08A1F61E7}" destId="{202B8E42-56EC-4F6F-B287-6BFE3E8911D1}" srcOrd="0" destOrd="0" presId="urn:microsoft.com/office/officeart/2005/8/layout/process5"/>
-    <dgm:cxn modelId="{30FCE3CE-082F-413D-915C-01C2BFBB09FB}" type="presOf" srcId="{F2C8586D-E9EC-49DE-A6E1-7395CCE564B6}" destId="{C552C226-DCF4-4C0B-9226-C4DC76870D11}" srcOrd="0" destOrd="2" presId="urn:microsoft.com/office/officeart/2005/8/layout/process5"/>
-    <dgm:cxn modelId="{A5148013-A7A8-45B2-8CAC-EFAA8FDF5023}" type="presOf" srcId="{CC576BF7-D0C4-45C0-8742-81D00CDE3EDA}" destId="{AE9BFCD7-65E9-4042-93B3-00254295DFC1}" srcOrd="1" destOrd="0" presId="urn:microsoft.com/office/officeart/2005/8/layout/process5"/>
-    <dgm:cxn modelId="{27B89C57-F4CB-468C-8E55-610CA3C79895}" type="presOf" srcId="{0A0E999D-969B-45C8-AFE8-AA11F26815D4}" destId="{B0605081-2CC9-4157-A707-056A7E67F165}" srcOrd="0" destOrd="0" presId="urn:microsoft.com/office/officeart/2005/8/layout/process5"/>
-    <dgm:cxn modelId="{2627E517-3229-46DC-9924-5AF64DCBE471}" srcId="{2EB99E6E-DD2C-44A8-96E3-DAEB06EBC057}" destId="{798A6FF1-55B3-448B-9510-4CF912534081}" srcOrd="8" destOrd="0" parTransId="{CAB4B1F3-FE0C-444F-AC74-499063FC8A54}" sibTransId="{84C407B1-5E4A-476A-B92D-CCF3FF3AAA46}"/>
-    <dgm:cxn modelId="{75562B10-8704-48FC-927D-3A95AF90A5D4}" type="presOf" srcId="{DD9F15A9-DA4A-4D14-9588-AA60C7521CFE}" destId="{7202BC0E-BCCD-4749-B8AE-EAEB96710794}" srcOrd="0" destOrd="1" presId="urn:microsoft.com/office/officeart/2005/8/layout/process5"/>
-    <dgm:cxn modelId="{24762DC5-1B7E-4F1F-905C-29FEED91CB84}" type="presOf" srcId="{E7A50803-F364-4CD4-AD78-41B1FBFF1BA8}" destId="{7202BC0E-BCCD-4749-B8AE-EAEB96710794}" srcOrd="0" destOrd="0" presId="urn:microsoft.com/office/officeart/2005/8/layout/process5"/>
-    <dgm:cxn modelId="{BE42C264-C53A-49FE-9239-12E6223C6359}" srcId="{2EB99E6E-DD2C-44A8-96E3-DAEB06EBC057}" destId="{F6634B8D-E0A8-4CF8-9547-DC651A569B35}" srcOrd="7" destOrd="0" parTransId="{CB1A9436-E5CF-4701-988D-B3D56913BC7A}" sibTransId="{0A0E999D-969B-45C8-AFE8-AA11F26815D4}"/>
-    <dgm:cxn modelId="{00BFEED2-4380-4B91-BE00-4AB756214262}" type="presOf" srcId="{4B69B0E3-8743-4939-B11F-528463168E2A}" destId="{3AD5559E-BD30-4C5E-8244-E975DFD4D66A}" srcOrd="0" destOrd="0" presId="urn:microsoft.com/office/officeart/2005/8/layout/process5"/>
-    <dgm:cxn modelId="{E6A9C202-5048-4AEE-908F-517DA2F11E0F}" type="presOf" srcId="{CC576BF7-D0C4-45C0-8742-81D00CDE3EDA}" destId="{7E7752DD-DCDB-41B0-B094-2281FBAA8726}" srcOrd="0" destOrd="0" presId="urn:microsoft.com/office/officeart/2005/8/layout/process5"/>
-    <dgm:cxn modelId="{63C128B9-6057-440A-967F-A62863682B62}" type="presOf" srcId="{82FE3047-50CF-40C0-939B-38F880054397}" destId="{B96C6DDC-F963-4B90-A0A4-7D9FCD4D5E46}" srcOrd="0" destOrd="0" presId="urn:microsoft.com/office/officeart/2005/8/layout/process5"/>
-    <dgm:cxn modelId="{F64C7351-5D29-4BA4-AF1B-F2B50925AC66}" type="presOf" srcId="{64943D96-19D2-4F2F-AB9D-7FACCD83237E}" destId="{0795C1ED-6176-4D71-8695-BFA260CD8DB5}" srcOrd="0" destOrd="0" presId="urn:microsoft.com/office/officeart/2005/8/layout/process5"/>
-    <dgm:cxn modelId="{9A4536DF-DA56-497F-A81B-7850E8220D4B}" srcId="{E7A50803-F364-4CD4-AD78-41B1FBFF1BA8}" destId="{0D096DC1-5A8B-4ADE-A057-0F5D5950C77F}" srcOrd="1" destOrd="0" parTransId="{3B29BF6D-8309-45FC-BAB5-34109509ECCA}" sibTransId="{AF508A93-BE0D-45D4-93D1-F78FB8325E97}"/>
-    <dgm:cxn modelId="{C75AF5CD-407B-4999-AA02-3D3C6183FB81}" type="presOf" srcId="{84C407B1-5E4A-476A-B92D-CCF3FF3AAA46}" destId="{6FC24B80-D800-4BB8-8862-1A8D3268A0E7}" srcOrd="1" destOrd="0" presId="urn:microsoft.com/office/officeart/2005/8/layout/process5"/>
-    <dgm:cxn modelId="{14580366-1FBC-4C21-8C8C-ECCEFC03B8D9}" srcId="{2EB99E6E-DD2C-44A8-96E3-DAEB06EBC057}" destId="{C385F31E-C6F1-41EB-A744-6A3BF2E406F6}" srcOrd="11" destOrd="0" parTransId="{D43C4031-2516-4EC0-BAAF-D4081E65232B}" sibTransId="{4B6C20F8-6B52-45DF-9F97-26B7A319589B}"/>
-    <dgm:cxn modelId="{C9D9C90E-4623-4921-81B9-E98F68171228}" type="presOf" srcId="{C7808C6A-1DE8-43E2-A730-B64DDB015688}" destId="{C552C226-DCF4-4C0B-9226-C4DC76870D11}" srcOrd="0" destOrd="1" presId="urn:microsoft.com/office/officeart/2005/8/layout/process5"/>
-    <dgm:cxn modelId="{F0B76648-D1DB-4962-BD86-92DA1CE3EB0D}" type="presOf" srcId="{B49C4D2D-FBEB-4D1C-B75F-C3DE01451527}" destId="{B7AFCB0A-375A-421B-BDCD-3F97A815491D}" srcOrd="1" destOrd="0" presId="urn:microsoft.com/office/officeart/2005/8/layout/process5"/>
     <dgm:cxn modelId="{DB6C55F8-08FF-41FB-994F-539D302E509A}" type="presOf" srcId="{252A868E-1D7A-4BD9-B234-19B2E62E0B3A}" destId="{425C393F-DC73-4F76-B412-3A9100D3169A}" srcOrd="1" destOrd="0" presId="urn:microsoft.com/office/officeart/2005/8/layout/process5"/>
     <dgm:cxn modelId="{8DED5335-A554-47BE-B0F1-84C02E919B4D}" type="presOf" srcId="{645BB4AE-23C8-4363-BE6C-2366BFD3FAE5}" destId="{427AD9CF-C940-4EE9-9DB4-80E286518A29}" srcOrd="1" destOrd="0" presId="urn:microsoft.com/office/officeart/2005/8/layout/process5"/>
+    <dgm:cxn modelId="{30FCE3CE-082F-413D-915C-01C2BFBB09FB}" type="presOf" srcId="{F2C8586D-E9EC-49DE-A6E1-7395CCE564B6}" destId="{C552C226-DCF4-4C0B-9226-C4DC76870D11}" srcOrd="0" destOrd="2" presId="urn:microsoft.com/office/officeart/2005/8/layout/process5"/>
+    <dgm:cxn modelId="{86FA6E9F-4A50-4531-90B7-D4D57815292D}" srcId="{2EB99E6E-DD2C-44A8-96E3-DAEB06EBC057}" destId="{E0D73B0D-2B54-4BB7-837B-A02C9C860C3A}" srcOrd="3" destOrd="0" parTransId="{5071B9E3-6C8F-4439-8171-3AC63096F4CB}" sibTransId="{E0319071-DA33-4CEE-AEED-77BDB96D497A}"/>
+    <dgm:cxn modelId="{BE42C264-C53A-49FE-9239-12E6223C6359}" srcId="{2EB99E6E-DD2C-44A8-96E3-DAEB06EBC057}" destId="{F6634B8D-E0A8-4CF8-9547-DC651A569B35}" srcOrd="6" destOrd="0" parTransId="{CB1A9436-E5CF-4701-988D-B3D56913BC7A}" sibTransId="{0A0E999D-969B-45C8-AFE8-AA11F26815D4}"/>
+    <dgm:cxn modelId="{62E71F3D-3D7F-41D5-9B1D-87BAF0BED455}" srcId="{2EB99E6E-DD2C-44A8-96E3-DAEB06EBC057}" destId="{2F8C4D08-CEAE-4B58-A0D0-64795F5C59C7}" srcOrd="4" destOrd="0" parTransId="{26EB697A-87DA-4349-B732-3735A40D88AA}" sibTransId="{82FE3047-50CF-40C0-939B-38F880054397}"/>
+    <dgm:cxn modelId="{5621462F-3CC6-4EEE-9D33-46219A504E6D}" type="presOf" srcId="{F6634B8D-E0A8-4CF8-9547-DC651A569B35}" destId="{99A2F953-EC43-4E7D-895E-E6CCB05BF9AC}" srcOrd="0" destOrd="0" presId="urn:microsoft.com/office/officeart/2005/8/layout/process5"/>
+    <dgm:cxn modelId="{F0B76648-D1DB-4962-BD86-92DA1CE3EB0D}" type="presOf" srcId="{B49C4D2D-FBEB-4D1C-B75F-C3DE01451527}" destId="{B7AFCB0A-375A-421B-BDCD-3F97A815491D}" srcOrd="1" destOrd="0" presId="urn:microsoft.com/office/officeart/2005/8/layout/process5"/>
+    <dgm:cxn modelId="{F021AE25-EB30-48EA-B612-B9F39466FE4B}" type="presOf" srcId="{E0319071-DA33-4CEE-AEED-77BDB96D497A}" destId="{9FEB6EAB-4890-41DE-90EE-B031032C219C}" srcOrd="0" destOrd="0" presId="urn:microsoft.com/office/officeart/2005/8/layout/process5"/>
+    <dgm:cxn modelId="{654C0E2D-9F02-4D0F-914E-7E3A5D6B9BCF}" type="presOf" srcId="{22D37AD1-831C-40F0-8FB9-6F8698F28185}" destId="{9038EBA2-D570-4040-AD91-DE80216ABD27}" srcOrd="0" destOrd="0" presId="urn:microsoft.com/office/officeart/2005/8/layout/process5"/>
+    <dgm:cxn modelId="{DD3B0ACD-011D-4B17-9D61-04D4BD2785B7}" type="presOf" srcId="{252A868E-1D7A-4BD9-B234-19B2E62E0B3A}" destId="{FE02FC1D-D3EB-4076-A80F-B80B5AAC7ABB}" srcOrd="0" destOrd="0" presId="urn:microsoft.com/office/officeart/2005/8/layout/process5"/>
+    <dgm:cxn modelId="{9EAB0024-D98F-496E-984F-8C71C8342C04}" type="presOf" srcId="{82FE3047-50CF-40C0-939B-38F880054397}" destId="{0448F131-E2C7-4E83-90A6-258E21432E6A}" srcOrd="1" destOrd="0" presId="urn:microsoft.com/office/officeart/2005/8/layout/process5"/>
+    <dgm:cxn modelId="{B4AA1D32-C979-436A-B940-B55501354F8A}" type="presOf" srcId="{E0D73B0D-2B54-4BB7-837B-A02C9C860C3A}" destId="{0631316F-807F-4C68-B220-03577B1939F8}" srcOrd="0" destOrd="0" presId="urn:microsoft.com/office/officeart/2005/8/layout/process5"/>
+    <dgm:cxn modelId="{27B89C57-F4CB-468C-8E55-610CA3C79895}" type="presOf" srcId="{0A0E999D-969B-45C8-AFE8-AA11F26815D4}" destId="{B0605081-2CC9-4157-A707-056A7E67F165}" srcOrd="0" destOrd="0" presId="urn:microsoft.com/office/officeart/2005/8/layout/process5"/>
+    <dgm:cxn modelId="{BF503448-2551-4E50-A12E-D6096D13B8D4}" type="presOf" srcId="{7A900D74-D999-4C0D-903D-9385AF28B32A}" destId="{F5157131-9131-47E0-91C7-C2708EA7DF4E}" srcOrd="0" destOrd="0" presId="urn:microsoft.com/office/officeart/2005/8/layout/process5"/>
     <dgm:cxn modelId="{3AB88BB3-706E-4D03-9A46-4EF26D7248CD}" type="presOf" srcId="{798A6FF1-55B3-448B-9510-4CF912534081}" destId="{56040DE5-8429-4ADC-872E-25108EC0DBDB}" srcOrd="0" destOrd="0" presId="urn:microsoft.com/office/officeart/2005/8/layout/process5"/>
-    <dgm:cxn modelId="{CC3E495E-6A70-4A9B-9CE2-44C302E880D3}" type="presOf" srcId="{DA4329DA-20FA-4C38-857D-B35ED56ACC55}" destId="{28D40CE1-835B-4A7B-8244-943B63DB6594}" srcOrd="0" destOrd="0" presId="urn:microsoft.com/office/officeart/2005/8/layout/process5"/>
+    <dgm:cxn modelId="{C6D66385-2E42-4D46-B355-5E76D582C027}" srcId="{11759023-B539-4A9D-9148-695A907123CF}" destId="{C7808C6A-1DE8-43E2-A730-B64DDB015688}" srcOrd="0" destOrd="0" parTransId="{FE65013A-12E9-4023-BCF8-23FFE3C22F40}" sibTransId="{028CFA6C-EFD8-4C34-8F15-0E9A206101A7}"/>
+    <dgm:cxn modelId="{C1F3C3A4-473F-4899-9359-ABF785E5521F}" srcId="{2EB99E6E-DD2C-44A8-96E3-DAEB06EBC057}" destId="{7C7B550B-1B4D-42E2-ACFC-728546073CB1}" srcOrd="9" destOrd="0" parTransId="{1232A2E5-A2F1-4B11-BB50-2442B9B6E618}" sibTransId="{645BB4AE-23C8-4363-BE6C-2366BFD3FAE5}"/>
+    <dgm:cxn modelId="{0CF353D1-1F18-4E3E-AE22-6BA9BA857BF4}" type="presOf" srcId="{E0319071-DA33-4CEE-AEED-77BDB96D497A}" destId="{B3D31688-DAC1-45E7-8B67-DB84E8ED7C7F}" srcOrd="1" destOrd="0" presId="urn:microsoft.com/office/officeart/2005/8/layout/process5"/>
+    <dgm:cxn modelId="{38C7846C-A3D6-4079-970D-4790872C6BDF}" srcId="{22D37AD1-831C-40F0-8FB9-6F8698F28185}" destId="{6079760F-3BEB-448E-8C4C-D07379A5E46D}" srcOrd="0" destOrd="0" parTransId="{3F15C46F-5BC4-4346-8681-CE05BF6A8676}" sibTransId="{64943D96-19D2-4F2F-AB9D-7FACCD83237E}"/>
+    <dgm:cxn modelId="{1BDF8DBC-AD08-4BE6-B455-50F9C8AB0C47}" type="presOf" srcId="{7C7B550B-1B4D-42E2-ACFC-728546073CB1}" destId="{89DADE2F-0EC1-44A0-92D9-021DF56E312B}" srcOrd="0" destOrd="0" presId="urn:microsoft.com/office/officeart/2005/8/layout/process5"/>
+    <dgm:cxn modelId="{E5C7CD86-EC86-4052-8490-293639201F0A}" srcId="{2EB99E6E-DD2C-44A8-96E3-DAEB06EBC057}" destId="{22D37AD1-831C-40F0-8FB9-6F8698F28185}" srcOrd="5" destOrd="0" parTransId="{A25D6232-A6E1-4103-AEFA-7192B95A97C0}" sibTransId="{F7E4BF3C-DD43-4FBE-8890-CB2C899CFBEE}"/>
+    <dgm:cxn modelId="{8D3E1448-D30F-46E4-88BA-A5A85580627D}" type="presOf" srcId="{2F8C4D08-CEAE-4B58-A0D0-64795F5C59C7}" destId="{9DCBE7C4-77E3-4D84-882B-7F8484E636DC}" srcOrd="0" destOrd="0" presId="urn:microsoft.com/office/officeart/2005/8/layout/process5"/>
+    <dgm:cxn modelId="{3B90CBB8-3BB1-4937-AEAB-B48FD617DB9A}" type="presOf" srcId="{B49C4D2D-FBEB-4D1C-B75F-C3DE01451527}" destId="{4E482C98-6EFA-4C20-AE49-96BEB2724FA0}" srcOrd="0" destOrd="0" presId="urn:microsoft.com/office/officeart/2005/8/layout/process5"/>
+    <dgm:cxn modelId="{BBE56D49-1FE7-4E1E-8678-125662576E0F}" type="presOf" srcId="{F7E4BF3C-DD43-4FBE-8890-CB2C899CFBEE}" destId="{604B6F34-710D-40C8-8805-5FC71845512E}" srcOrd="0" destOrd="0" presId="urn:microsoft.com/office/officeart/2005/8/layout/process5"/>
+    <dgm:cxn modelId="{381362CE-EA91-4DC6-AA83-039080D7D497}" srcId="{E7A50803-F364-4CD4-AD78-41B1FBFF1BA8}" destId="{DD9F15A9-DA4A-4D14-9588-AA60C7521CFE}" srcOrd="0" destOrd="0" parTransId="{479FDE72-7A42-42BE-9DC8-20498FF7B4A7}" sibTransId="{300F9D5C-0CF9-4756-8C02-37299F1620C7}"/>
+    <dgm:cxn modelId="{C75AF5CD-407B-4999-AA02-3D3C6183FB81}" type="presOf" srcId="{84C407B1-5E4A-476A-B92D-CCF3FF3AAA46}" destId="{6FC24B80-D800-4BB8-8862-1A8D3268A0E7}" srcOrd="1" destOrd="0" presId="urn:microsoft.com/office/officeart/2005/8/layout/process5"/>
+    <dgm:cxn modelId="{06C594FE-5AFA-48DB-8E09-4DE0E4DD2E92}" type="presOf" srcId="{4F55A451-EEAC-4794-AD1A-88C08A1F61E7}" destId="{202B8E42-56EC-4F6F-B287-6BFE3E8911D1}" srcOrd="0" destOrd="0" presId="urn:microsoft.com/office/officeart/2005/8/layout/process5"/>
+    <dgm:cxn modelId="{2627E517-3229-46DC-9924-5AF64DCBE471}" srcId="{2EB99E6E-DD2C-44A8-96E3-DAEB06EBC057}" destId="{798A6FF1-55B3-448B-9510-4CF912534081}" srcOrd="7" destOrd="0" parTransId="{CAB4B1F3-FE0C-444F-AC74-499063FC8A54}" sibTransId="{84C407B1-5E4A-476A-B92D-CCF3FF3AAA46}"/>
+    <dgm:cxn modelId="{40EF2476-88D6-4D65-A834-7B8200D87526}" srcId="{22D37AD1-831C-40F0-8FB9-6F8698F28185}" destId="{E7A50803-F364-4CD4-AD78-41B1FBFF1BA8}" srcOrd="1" destOrd="0" parTransId="{407CD609-00D6-48E0-AA13-550B24BE3F19}" sibTransId="{DA4329DA-20FA-4C38-857D-B35ED56ACC55}"/>
+    <dgm:cxn modelId="{8DACDA3E-740D-4DF1-8F8A-6ACAC57731CD}" type="presOf" srcId="{2EB99E6E-DD2C-44A8-96E3-DAEB06EBC057}" destId="{9233F2E0-5E4E-4D44-8197-09E76C5F6FEB}" srcOrd="0" destOrd="0" presId="urn:microsoft.com/office/officeart/2005/8/layout/process5"/>
+    <dgm:cxn modelId="{06EBD534-FC6D-42BB-8C8C-3F427933A1E4}" type="presOf" srcId="{DD9F15A9-DA4A-4D14-9588-AA60C7521CFE}" destId="{9038EBA2-D570-4040-AD91-DE80216ABD27}" srcOrd="0" destOrd="3" presId="urn:microsoft.com/office/officeart/2005/8/layout/process5"/>
+    <dgm:cxn modelId="{316A43C6-60ED-43E3-BF7B-3451CFE4A015}" srcId="{2EB99E6E-DD2C-44A8-96E3-DAEB06EBC057}" destId="{4F55A451-EEAC-4794-AD1A-88C08A1F61E7}" srcOrd="8" destOrd="0" parTransId="{57EFACCD-38DF-41A4-BB5E-FED8CF177E2E}" sibTransId="{7A900D74-D999-4C0D-903D-9385AF28B32A}"/>
+    <dgm:cxn modelId="{149B82F1-F9D5-4B8C-AE0C-61CC7E7717A3}" type="presOf" srcId="{F7E4BF3C-DD43-4FBE-8890-CB2C899CFBEE}" destId="{5573A9C5-32E3-4FB7-A8A8-AA74B345325A}" srcOrd="1" destOrd="0" presId="urn:microsoft.com/office/officeart/2005/8/layout/process5"/>
+    <dgm:cxn modelId="{36375326-BE41-4699-AA2A-CF8DF5938E42}" type="presOf" srcId="{C385F31E-C6F1-41EB-A744-6A3BF2E406F6}" destId="{C269A2E3-8621-4697-96C7-19DDAF8DBEF2}" srcOrd="0" destOrd="0" presId="urn:microsoft.com/office/officeart/2005/8/layout/process5"/>
     <dgm:cxn modelId="{D6BAC6BD-42CA-42C2-B1EB-80649B7B100A}" type="presOf" srcId="{7A900D74-D999-4C0D-903D-9385AF28B32A}" destId="{FA657519-C910-4034-B3AB-F451068D97BB}" srcOrd="1" destOrd="0" presId="urn:microsoft.com/office/officeart/2005/8/layout/process5"/>
+    <dgm:cxn modelId="{E6A9C202-5048-4AEE-908F-517DA2F11E0F}" type="presOf" srcId="{CC576BF7-D0C4-45C0-8742-81D00CDE3EDA}" destId="{7E7752DD-DCDB-41B0-B094-2281FBAA8726}" srcOrd="0" destOrd="0" presId="urn:microsoft.com/office/officeart/2005/8/layout/process5"/>
+    <dgm:cxn modelId="{78EFCC25-2FFB-4294-BBDB-069F5F18EAC1}" type="presOf" srcId="{0A0E999D-969B-45C8-AFE8-AA11F26815D4}" destId="{6C3D7124-8CE6-43EF-B903-996C1AE4DCA8}" srcOrd="1" destOrd="0" presId="urn:microsoft.com/office/officeart/2005/8/layout/process5"/>
+    <dgm:cxn modelId="{656A6730-4775-4A3E-936E-91899811DB25}" srcId="{2EB99E6E-DD2C-44A8-96E3-DAEB06EBC057}" destId="{3D9A5FDC-149F-4871-AC0B-41FE9D85C64C}" srcOrd="2" destOrd="0" parTransId="{4648DA37-ADCA-4572-A170-AFF1D6B8114C}" sibTransId="{252A868E-1D7A-4BD9-B234-19B2E62E0B3A}"/>
+    <dgm:cxn modelId="{63C128B9-6057-440A-967F-A62863682B62}" type="presOf" srcId="{82FE3047-50CF-40C0-939B-38F880054397}" destId="{B96C6DDC-F963-4B90-A0A4-7D9FCD4D5E46}" srcOrd="0" destOrd="0" presId="urn:microsoft.com/office/officeart/2005/8/layout/process5"/>
     <dgm:cxn modelId="{F12BEC8D-F482-4DFF-98C9-B2A773153546}" srcId="{2EB99E6E-DD2C-44A8-96E3-DAEB06EBC057}" destId="{4B69B0E3-8743-4939-B11F-528463168E2A}" srcOrd="0" destOrd="0" parTransId="{AAB7FF21-EBB3-4589-853C-64AEFF5CB37C}" sibTransId="{CC576BF7-D0C4-45C0-8742-81D00CDE3EDA}"/>
-    <dgm:cxn modelId="{86FA6E9F-4A50-4531-90B7-D4D57815292D}" srcId="{2EB99E6E-DD2C-44A8-96E3-DAEB06EBC057}" destId="{E0D73B0D-2B54-4BB7-837B-A02C9C860C3A}" srcOrd="3" destOrd="0" parTransId="{5071B9E3-6C8F-4439-8171-3AC63096F4CB}" sibTransId="{E0319071-DA33-4CEE-AEED-77BDB96D497A}"/>
-    <dgm:cxn modelId="{2063C62C-2087-4368-82DA-E5812A0DBAD2}" type="presOf" srcId="{0D096DC1-5A8B-4ADE-A057-0F5D5950C77F}" destId="{7202BC0E-BCCD-4749-B8AE-EAEB96710794}" srcOrd="0" destOrd="2" presId="urn:microsoft.com/office/officeart/2005/8/layout/process5"/>
-    <dgm:cxn modelId="{9EAB0024-D98F-496E-984F-8C71C8342C04}" type="presOf" srcId="{82FE3047-50CF-40C0-939B-38F880054397}" destId="{0448F131-E2C7-4E83-90A6-258E21432E6A}" srcOrd="1" destOrd="0" presId="urn:microsoft.com/office/officeart/2005/8/layout/process5"/>
-    <dgm:cxn modelId="{38C7846C-A3D6-4079-970D-4790872C6BDF}" srcId="{2EB99E6E-DD2C-44A8-96E3-DAEB06EBC057}" destId="{6079760F-3BEB-448E-8C4C-D07379A5E46D}" srcOrd="5" destOrd="0" parTransId="{3F15C46F-5BC4-4346-8681-CE05BF6A8676}" sibTransId="{64943D96-19D2-4F2F-AB9D-7FACCD83237E}"/>
-    <dgm:cxn modelId="{F021AE25-EB30-48EA-B612-B9F39466FE4B}" type="presOf" srcId="{E0319071-DA33-4CEE-AEED-77BDB96D497A}" destId="{9FEB6EAB-4890-41DE-90EE-B031032C219C}" srcOrd="0" destOrd="0" presId="urn:microsoft.com/office/officeart/2005/8/layout/process5"/>
-    <dgm:cxn modelId="{5621462F-3CC6-4EEE-9D33-46219A504E6D}" type="presOf" srcId="{F6634B8D-E0A8-4CF8-9547-DC651A569B35}" destId="{99A2F953-EC43-4E7D-895E-E6CCB05BF9AC}" srcOrd="0" destOrd="0" presId="urn:microsoft.com/office/officeart/2005/8/layout/process5"/>
-    <dgm:cxn modelId="{DB0B18EC-FCB6-4AE2-8D02-2CC9FC63F21C}" type="presOf" srcId="{84C407B1-5E4A-476A-B92D-CCF3FF3AAA46}" destId="{8875B72C-833D-4C06-88C7-8621517377BC}" srcOrd="0" destOrd="0" presId="urn:microsoft.com/office/officeart/2005/8/layout/process5"/>
-    <dgm:cxn modelId="{62E71F3D-3D7F-41D5-9B1D-87BAF0BED455}" srcId="{2EB99E6E-DD2C-44A8-96E3-DAEB06EBC057}" destId="{2F8C4D08-CEAE-4B58-A0D0-64795F5C59C7}" srcOrd="4" destOrd="0" parTransId="{26EB697A-87DA-4349-B732-3735A40D88AA}" sibTransId="{82FE3047-50CF-40C0-939B-38F880054397}"/>
-    <dgm:cxn modelId="{1BDF8DBC-AD08-4BE6-B455-50F9C8AB0C47}" type="presOf" srcId="{7C7B550B-1B4D-42E2-ACFC-728546073CB1}" destId="{89DADE2F-0EC1-44A0-92D9-021DF56E312B}" srcOrd="0" destOrd="0" presId="urn:microsoft.com/office/officeart/2005/8/layout/process5"/>
-    <dgm:cxn modelId="{0CF353D1-1F18-4E3E-AE22-6BA9BA857BF4}" type="presOf" srcId="{E0319071-DA33-4CEE-AEED-77BDB96D497A}" destId="{B3D31688-DAC1-45E7-8B67-DB84E8ED7C7F}" srcOrd="1" destOrd="0" presId="urn:microsoft.com/office/officeart/2005/8/layout/process5"/>
-    <dgm:cxn modelId="{1A1864AA-6C88-4A72-A88A-383848E48098}" srcId="{2EB99E6E-DD2C-44A8-96E3-DAEB06EBC057}" destId="{11759023-B539-4A9D-9148-695A907123CF}" srcOrd="1" destOrd="0" parTransId="{CB27E4A7-A152-416A-AE74-8BAADA362E30}" sibTransId="{B49C4D2D-FBEB-4D1C-B75F-C3DE01451527}"/>
-    <dgm:cxn modelId="{78EFCC25-2FFB-4294-BBDB-069F5F18EAC1}" type="presOf" srcId="{0A0E999D-969B-45C8-AFE8-AA11F26815D4}" destId="{6C3D7124-8CE6-43EF-B903-996C1AE4DCA8}" srcOrd="1" destOrd="0" presId="urn:microsoft.com/office/officeart/2005/8/layout/process5"/>
-    <dgm:cxn modelId="{8DACDA3E-740D-4DF1-8F8A-6ACAC57731CD}" type="presOf" srcId="{2EB99E6E-DD2C-44A8-96E3-DAEB06EBC057}" destId="{9233F2E0-5E4E-4D44-8197-09E76C5F6FEB}" srcOrd="0" destOrd="0" presId="urn:microsoft.com/office/officeart/2005/8/layout/process5"/>
-    <dgm:cxn modelId="{5820A6EF-4FC6-431B-AD2F-DCD004992DA4}" type="presOf" srcId="{11759023-B539-4A9D-9148-695A907123CF}" destId="{C552C226-DCF4-4C0B-9226-C4DC76870D11}" srcOrd="0" destOrd="0" presId="urn:microsoft.com/office/officeart/2005/8/layout/process5"/>
-    <dgm:cxn modelId="{8C026A88-CF37-4677-A54E-B7502115912A}" type="presOf" srcId="{64943D96-19D2-4F2F-AB9D-7FACCD83237E}" destId="{E4600BEF-D57A-4645-A92E-7E96936C5191}" srcOrd="1" destOrd="0" presId="urn:microsoft.com/office/officeart/2005/8/layout/process5"/>
-    <dgm:cxn modelId="{C6D66385-2E42-4D46-B355-5E76D582C027}" srcId="{11759023-B539-4A9D-9148-695A907123CF}" destId="{C7808C6A-1DE8-43E2-A730-B64DDB015688}" srcOrd="0" destOrd="0" parTransId="{FE65013A-12E9-4023-BCF8-23FFE3C22F40}" sibTransId="{028CFA6C-EFD8-4C34-8F15-0E9A206101A7}"/>
-    <dgm:cxn modelId="{EF5C2330-6761-4CAD-96F8-71D82ACC91E2}" srcId="{11759023-B539-4A9D-9148-695A907123CF}" destId="{F2C8586D-E9EC-49DE-A6E1-7395CCE564B6}" srcOrd="1" destOrd="0" parTransId="{A79A6D4F-3843-4AB0-A812-5BD82272AA28}" sibTransId="{631743A5-1AC9-4D0A-B8C1-BF03301D7154}"/>
-    <dgm:cxn modelId="{C1F3C3A4-473F-4899-9359-ABF785E5521F}" srcId="{2EB99E6E-DD2C-44A8-96E3-DAEB06EBC057}" destId="{7C7B550B-1B4D-42E2-ACFC-728546073CB1}" srcOrd="10" destOrd="0" parTransId="{1232A2E5-A2F1-4B11-BB50-2442B9B6E618}" sibTransId="{645BB4AE-23C8-4363-BE6C-2366BFD3FAE5}"/>
-    <dgm:cxn modelId="{DD3B0ACD-011D-4B17-9D61-04D4BD2785B7}" type="presOf" srcId="{252A868E-1D7A-4BD9-B234-19B2E62E0B3A}" destId="{FE02FC1D-D3EB-4076-A80F-B80B5AAC7ABB}" srcOrd="0" destOrd="0" presId="urn:microsoft.com/office/officeart/2005/8/layout/process5"/>
-    <dgm:cxn modelId="{381362CE-EA91-4DC6-AA83-039080D7D497}" srcId="{E7A50803-F364-4CD4-AD78-41B1FBFF1BA8}" destId="{DD9F15A9-DA4A-4D14-9588-AA60C7521CFE}" srcOrd="0" destOrd="0" parTransId="{479FDE72-7A42-42BE-9DC8-20498FF7B4A7}" sibTransId="{300F9D5C-0CF9-4756-8C02-37299F1620C7}"/>
-    <dgm:cxn modelId="{316A43C6-60ED-43E3-BF7B-3451CFE4A015}" srcId="{2EB99E6E-DD2C-44A8-96E3-DAEB06EBC057}" destId="{4F55A451-EEAC-4794-AD1A-88C08A1F61E7}" srcOrd="9" destOrd="0" parTransId="{57EFACCD-38DF-41A4-BB5E-FED8CF177E2E}" sibTransId="{7A900D74-D999-4C0D-903D-9385AF28B32A}"/>
-    <dgm:cxn modelId="{656A6730-4775-4A3E-936E-91899811DB25}" srcId="{2EB99E6E-DD2C-44A8-96E3-DAEB06EBC057}" destId="{3D9A5FDC-149F-4871-AC0B-41FE9D85C64C}" srcOrd="2" destOrd="0" parTransId="{4648DA37-ADCA-4572-A170-AFF1D6B8114C}" sibTransId="{252A868E-1D7A-4BD9-B234-19B2E62E0B3A}"/>
-    <dgm:cxn modelId="{3B90CBB8-3BB1-4937-AEAB-B48FD617DB9A}" type="presOf" srcId="{B49C4D2D-FBEB-4D1C-B75F-C3DE01451527}" destId="{4E482C98-6EFA-4C20-AE49-96BEB2724FA0}" srcOrd="0" destOrd="0" presId="urn:microsoft.com/office/officeart/2005/8/layout/process5"/>
-    <dgm:cxn modelId="{BF503448-2551-4E50-A12E-D6096D13B8D4}" type="presOf" srcId="{7A900D74-D999-4C0D-903D-9385AF28B32A}" destId="{F5157131-9131-47E0-91C7-C2708EA7DF4E}" srcOrd="0" destOrd="0" presId="urn:microsoft.com/office/officeart/2005/8/layout/process5"/>
-    <dgm:cxn modelId="{212F0AE4-3169-414E-BCB9-C368722673C9}" type="presOf" srcId="{DA4329DA-20FA-4C38-857D-B35ED56ACC55}" destId="{4BC23CEC-7E80-4DB3-84E2-974D7F887BA4}" srcOrd="1" destOrd="0" presId="urn:microsoft.com/office/officeart/2005/8/layout/process5"/>
-    <dgm:cxn modelId="{B4AA1D32-C979-436A-B940-B55501354F8A}" type="presOf" srcId="{E0D73B0D-2B54-4BB7-837B-A02C9C860C3A}" destId="{0631316F-807F-4C68-B220-03577B1939F8}" srcOrd="0" destOrd="0" presId="urn:microsoft.com/office/officeart/2005/8/layout/process5"/>
+    <dgm:cxn modelId="{A5148013-A7A8-45B2-8CAC-EFAA8FDF5023}" type="presOf" srcId="{CC576BF7-D0C4-45C0-8742-81D00CDE3EDA}" destId="{AE9BFCD7-65E9-4042-93B3-00254295DFC1}" srcOrd="1" destOrd="0" presId="urn:microsoft.com/office/officeart/2005/8/layout/process5"/>
     <dgm:cxn modelId="{B62D6CEA-E566-49A8-9360-9E22CAFF7C74}" type="presParOf" srcId="{9233F2E0-5E4E-4D44-8197-09E76C5F6FEB}" destId="{3AD5559E-BD30-4C5E-8244-E975DFD4D66A}" srcOrd="0" destOrd="0" presId="urn:microsoft.com/office/officeart/2005/8/layout/process5"/>
     <dgm:cxn modelId="{C4516AC8-7530-4F67-B32A-650F2C487011}" type="presParOf" srcId="{9233F2E0-5E4E-4D44-8197-09E76C5F6FEB}" destId="{7E7752DD-DCDB-41B0-B094-2281FBAA8726}" srcOrd="1" destOrd="0" presId="urn:microsoft.com/office/officeart/2005/8/layout/process5"/>
     <dgm:cxn modelId="{66E99241-817B-4AAF-9854-58A965611DAB}" type="presParOf" srcId="{7E7752DD-DCDB-41B0-B094-2281FBAA8726}" destId="{AE9BFCD7-65E9-4042-93B3-00254295DFC1}" srcOrd="0" destOrd="0" presId="urn:microsoft.com/office/officeart/2005/8/layout/process5"/>
@@ -6256,25 +6290,22 @@
     <dgm:cxn modelId="{8EE0C477-9797-4D0B-9B8F-8C40ABDFFEDA}" type="presParOf" srcId="{9233F2E0-5E4E-4D44-8197-09E76C5F6FEB}" destId="{9DCBE7C4-77E3-4D84-882B-7F8484E636DC}" srcOrd="8" destOrd="0" presId="urn:microsoft.com/office/officeart/2005/8/layout/process5"/>
     <dgm:cxn modelId="{7D4637DD-40BA-434B-A3C9-AC7732F39937}" type="presParOf" srcId="{9233F2E0-5E4E-4D44-8197-09E76C5F6FEB}" destId="{B96C6DDC-F963-4B90-A0A4-7D9FCD4D5E46}" srcOrd="9" destOrd="0" presId="urn:microsoft.com/office/officeart/2005/8/layout/process5"/>
     <dgm:cxn modelId="{DADD0E1B-08B9-4C92-A292-57B8483F9A84}" type="presParOf" srcId="{B96C6DDC-F963-4B90-A0A4-7D9FCD4D5E46}" destId="{0448F131-E2C7-4E83-90A6-258E21432E6A}" srcOrd="0" destOrd="0" presId="urn:microsoft.com/office/officeart/2005/8/layout/process5"/>
-    <dgm:cxn modelId="{7E583BF1-78CE-498A-9B69-DE547D5FDE5D}" type="presParOf" srcId="{9233F2E0-5E4E-4D44-8197-09E76C5F6FEB}" destId="{6BFB2FC8-D0D9-4EF7-88E7-53C32EB04ED2}" srcOrd="10" destOrd="0" presId="urn:microsoft.com/office/officeart/2005/8/layout/process5"/>
-    <dgm:cxn modelId="{A268952D-9616-4736-8D99-ED8861A96504}" type="presParOf" srcId="{9233F2E0-5E4E-4D44-8197-09E76C5F6FEB}" destId="{0795C1ED-6176-4D71-8695-BFA260CD8DB5}" srcOrd="11" destOrd="0" presId="urn:microsoft.com/office/officeart/2005/8/layout/process5"/>
-    <dgm:cxn modelId="{570C52C9-7B09-4651-B7FF-C735C114BAB8}" type="presParOf" srcId="{0795C1ED-6176-4D71-8695-BFA260CD8DB5}" destId="{E4600BEF-D57A-4645-A92E-7E96936C5191}" srcOrd="0" destOrd="0" presId="urn:microsoft.com/office/officeart/2005/8/layout/process5"/>
-    <dgm:cxn modelId="{88046035-6F45-4B4D-8D0C-4FF741C42133}" type="presParOf" srcId="{9233F2E0-5E4E-4D44-8197-09E76C5F6FEB}" destId="{7202BC0E-BCCD-4749-B8AE-EAEB96710794}" srcOrd="12" destOrd="0" presId="urn:microsoft.com/office/officeart/2005/8/layout/process5"/>
-    <dgm:cxn modelId="{F859A709-6E86-4D3E-A0F8-6F91E20FA654}" type="presParOf" srcId="{9233F2E0-5E4E-4D44-8197-09E76C5F6FEB}" destId="{28D40CE1-835B-4A7B-8244-943B63DB6594}" srcOrd="13" destOrd="0" presId="urn:microsoft.com/office/officeart/2005/8/layout/process5"/>
-    <dgm:cxn modelId="{BFE2CEA9-06D9-431F-B4E1-A54FBBB434D3}" type="presParOf" srcId="{28D40CE1-835B-4A7B-8244-943B63DB6594}" destId="{4BC23CEC-7E80-4DB3-84E2-974D7F887BA4}" srcOrd="0" destOrd="0" presId="urn:microsoft.com/office/officeart/2005/8/layout/process5"/>
-    <dgm:cxn modelId="{1B1287E2-4A64-4B89-8CF0-AFB162A7749C}" type="presParOf" srcId="{9233F2E0-5E4E-4D44-8197-09E76C5F6FEB}" destId="{99A2F953-EC43-4E7D-895E-E6CCB05BF9AC}" srcOrd="14" destOrd="0" presId="urn:microsoft.com/office/officeart/2005/8/layout/process5"/>
-    <dgm:cxn modelId="{008430AD-FEFD-448D-9348-1FCDBAD75A45}" type="presParOf" srcId="{9233F2E0-5E4E-4D44-8197-09E76C5F6FEB}" destId="{B0605081-2CC9-4157-A707-056A7E67F165}" srcOrd="15" destOrd="0" presId="urn:microsoft.com/office/officeart/2005/8/layout/process5"/>
+    <dgm:cxn modelId="{68ACADCE-3068-4753-9DFD-A5D8B22BEFAA}" type="presParOf" srcId="{9233F2E0-5E4E-4D44-8197-09E76C5F6FEB}" destId="{9038EBA2-D570-4040-AD91-DE80216ABD27}" srcOrd="10" destOrd="0" presId="urn:microsoft.com/office/officeart/2005/8/layout/process5"/>
+    <dgm:cxn modelId="{3BF79FEA-4E2E-4B5C-B526-5EDFC6F0C7F5}" type="presParOf" srcId="{9233F2E0-5E4E-4D44-8197-09E76C5F6FEB}" destId="{604B6F34-710D-40C8-8805-5FC71845512E}" srcOrd="11" destOrd="0" presId="urn:microsoft.com/office/officeart/2005/8/layout/process5"/>
+    <dgm:cxn modelId="{26DE5AFA-C111-481F-AA8A-A26BD8FD9AB5}" type="presParOf" srcId="{604B6F34-710D-40C8-8805-5FC71845512E}" destId="{5573A9C5-32E3-4FB7-A8A8-AA74B345325A}" srcOrd="0" destOrd="0" presId="urn:microsoft.com/office/officeart/2005/8/layout/process5"/>
+    <dgm:cxn modelId="{1B1287E2-4A64-4B89-8CF0-AFB162A7749C}" type="presParOf" srcId="{9233F2E0-5E4E-4D44-8197-09E76C5F6FEB}" destId="{99A2F953-EC43-4E7D-895E-E6CCB05BF9AC}" srcOrd="12" destOrd="0" presId="urn:microsoft.com/office/officeart/2005/8/layout/process5"/>
+    <dgm:cxn modelId="{008430AD-FEFD-448D-9348-1FCDBAD75A45}" type="presParOf" srcId="{9233F2E0-5E4E-4D44-8197-09E76C5F6FEB}" destId="{B0605081-2CC9-4157-A707-056A7E67F165}" srcOrd="13" destOrd="0" presId="urn:microsoft.com/office/officeart/2005/8/layout/process5"/>
     <dgm:cxn modelId="{53B7158D-261B-4EED-BBD7-9E2AFD1A0F81}" type="presParOf" srcId="{B0605081-2CC9-4157-A707-056A7E67F165}" destId="{6C3D7124-8CE6-43EF-B903-996C1AE4DCA8}" srcOrd="0" destOrd="0" presId="urn:microsoft.com/office/officeart/2005/8/layout/process5"/>
-    <dgm:cxn modelId="{58780A94-6DD1-4137-90A6-629DF6F5B462}" type="presParOf" srcId="{9233F2E0-5E4E-4D44-8197-09E76C5F6FEB}" destId="{56040DE5-8429-4ADC-872E-25108EC0DBDB}" srcOrd="16" destOrd="0" presId="urn:microsoft.com/office/officeart/2005/8/layout/process5"/>
-    <dgm:cxn modelId="{DC731686-FAF4-4475-8093-BE84B88D5727}" type="presParOf" srcId="{9233F2E0-5E4E-4D44-8197-09E76C5F6FEB}" destId="{8875B72C-833D-4C06-88C7-8621517377BC}" srcOrd="17" destOrd="0" presId="urn:microsoft.com/office/officeart/2005/8/layout/process5"/>
+    <dgm:cxn modelId="{58780A94-6DD1-4137-90A6-629DF6F5B462}" type="presParOf" srcId="{9233F2E0-5E4E-4D44-8197-09E76C5F6FEB}" destId="{56040DE5-8429-4ADC-872E-25108EC0DBDB}" srcOrd="14" destOrd="0" presId="urn:microsoft.com/office/officeart/2005/8/layout/process5"/>
+    <dgm:cxn modelId="{DC731686-FAF4-4475-8093-BE84B88D5727}" type="presParOf" srcId="{9233F2E0-5E4E-4D44-8197-09E76C5F6FEB}" destId="{8875B72C-833D-4C06-88C7-8621517377BC}" srcOrd="15" destOrd="0" presId="urn:microsoft.com/office/officeart/2005/8/layout/process5"/>
     <dgm:cxn modelId="{5CDBA868-6174-489B-9862-DC5E32FB9815}" type="presParOf" srcId="{8875B72C-833D-4C06-88C7-8621517377BC}" destId="{6FC24B80-D800-4BB8-8862-1A8D3268A0E7}" srcOrd="0" destOrd="0" presId="urn:microsoft.com/office/officeart/2005/8/layout/process5"/>
-    <dgm:cxn modelId="{85541CC5-001B-4C62-A758-654A846446DB}" type="presParOf" srcId="{9233F2E0-5E4E-4D44-8197-09E76C5F6FEB}" destId="{202B8E42-56EC-4F6F-B287-6BFE3E8911D1}" srcOrd="18" destOrd="0" presId="urn:microsoft.com/office/officeart/2005/8/layout/process5"/>
-    <dgm:cxn modelId="{285310E5-E73C-4C00-9ECB-7C52CCE5AA58}" type="presParOf" srcId="{9233F2E0-5E4E-4D44-8197-09E76C5F6FEB}" destId="{F5157131-9131-47E0-91C7-C2708EA7DF4E}" srcOrd="19" destOrd="0" presId="urn:microsoft.com/office/officeart/2005/8/layout/process5"/>
+    <dgm:cxn modelId="{85541CC5-001B-4C62-A758-654A846446DB}" type="presParOf" srcId="{9233F2E0-5E4E-4D44-8197-09E76C5F6FEB}" destId="{202B8E42-56EC-4F6F-B287-6BFE3E8911D1}" srcOrd="16" destOrd="0" presId="urn:microsoft.com/office/officeart/2005/8/layout/process5"/>
+    <dgm:cxn modelId="{285310E5-E73C-4C00-9ECB-7C52CCE5AA58}" type="presParOf" srcId="{9233F2E0-5E4E-4D44-8197-09E76C5F6FEB}" destId="{F5157131-9131-47E0-91C7-C2708EA7DF4E}" srcOrd="17" destOrd="0" presId="urn:microsoft.com/office/officeart/2005/8/layout/process5"/>
     <dgm:cxn modelId="{9371B60F-0F90-4A97-8717-F42AE7B5D63F}" type="presParOf" srcId="{F5157131-9131-47E0-91C7-C2708EA7DF4E}" destId="{FA657519-C910-4034-B3AB-F451068D97BB}" srcOrd="0" destOrd="0" presId="urn:microsoft.com/office/officeart/2005/8/layout/process5"/>
-    <dgm:cxn modelId="{D56F87DC-F6A9-444A-9DF6-B213F401C961}" type="presParOf" srcId="{9233F2E0-5E4E-4D44-8197-09E76C5F6FEB}" destId="{89DADE2F-0EC1-44A0-92D9-021DF56E312B}" srcOrd="20" destOrd="0" presId="urn:microsoft.com/office/officeart/2005/8/layout/process5"/>
-    <dgm:cxn modelId="{4139F66E-07BD-42F2-A09C-85C067D92204}" type="presParOf" srcId="{9233F2E0-5E4E-4D44-8197-09E76C5F6FEB}" destId="{CD0FEDB8-BCC7-4F7B-BCF9-F14D929D684E}" srcOrd="21" destOrd="0" presId="urn:microsoft.com/office/officeart/2005/8/layout/process5"/>
+    <dgm:cxn modelId="{D56F87DC-F6A9-444A-9DF6-B213F401C961}" type="presParOf" srcId="{9233F2E0-5E4E-4D44-8197-09E76C5F6FEB}" destId="{89DADE2F-0EC1-44A0-92D9-021DF56E312B}" srcOrd="18" destOrd="0" presId="urn:microsoft.com/office/officeart/2005/8/layout/process5"/>
+    <dgm:cxn modelId="{4139F66E-07BD-42F2-A09C-85C067D92204}" type="presParOf" srcId="{9233F2E0-5E4E-4D44-8197-09E76C5F6FEB}" destId="{CD0FEDB8-BCC7-4F7B-BCF9-F14D929D684E}" srcOrd="19" destOrd="0" presId="urn:microsoft.com/office/officeart/2005/8/layout/process5"/>
     <dgm:cxn modelId="{1EC03459-C0DE-41D6-B841-0BE5ACCC3345}" type="presParOf" srcId="{CD0FEDB8-BCC7-4F7B-BCF9-F14D929D684E}" destId="{427AD9CF-C940-4EE9-9DB4-80E286518A29}" srcOrd="0" destOrd="0" presId="urn:microsoft.com/office/officeart/2005/8/layout/process5"/>
-    <dgm:cxn modelId="{6038D219-3EA9-4963-80A5-324F5D4A8FBB}" type="presParOf" srcId="{9233F2E0-5E4E-4D44-8197-09E76C5F6FEB}" destId="{C269A2E3-8621-4697-96C7-19DDAF8DBEF2}" srcOrd="22" destOrd="0" presId="urn:microsoft.com/office/officeart/2005/8/layout/process5"/>
+    <dgm:cxn modelId="{6038D219-3EA9-4963-80A5-324F5D4A8FBB}" type="presParOf" srcId="{9233F2E0-5E4E-4D44-8197-09E76C5F6FEB}" destId="{C269A2E3-8621-4697-96C7-19DDAF8DBEF2}" srcOrd="20" destOrd="0" presId="urn:microsoft.com/office/officeart/2005/8/layout/process5"/>
   </dgm:cxnLst>
   <dgm:bg/>
   <dgm:whole/>
@@ -6535,11 +6566,7 @@
         <a:p>
           <a:r>
             <a:rPr lang="en-US" dirty="0" smtClean="0"/>
-            <a:t>Store user data (ID, </a:t>
-          </a:r>
-          <a:r>
-            <a:rPr lang="en-US" dirty="0" smtClean="0"/>
-            <a:t>name, mac </a:t>
+            <a:t>Store user data (ID, name, mac </a:t>
           </a:r>
           <a:r>
             <a:rPr lang="en-US" dirty="0" err="1" smtClean="0"/>
@@ -6616,15 +6643,7 @@
         <a:p>
           <a:r>
             <a:rPr lang="en-US" dirty="0" smtClean="0"/>
-            <a:t>Ask mentor </a:t>
-          </a:r>
-          <a:r>
-            <a:rPr lang="en-US" dirty="0" smtClean="0"/>
-            <a:t>&amp; server team for </a:t>
-          </a:r>
-          <a:r>
-            <a:rPr lang="en-US" dirty="0" smtClean="0"/>
-            <a:t>more information </a:t>
+            <a:t>Ask mentor &amp; server team for more information </a:t>
           </a:r>
           <a:r>
             <a:rPr lang="en-US" dirty="0" smtClean="0">
@@ -11404,12 +11423,12 @@
         </a:fontRef>
       </dsp:style>
       <dsp:txBody>
-        <a:bodyPr spcFirstLastPara="0" vert="horz" wrap="square" lIns="64770" tIns="64770" rIns="64770" bIns="64770" numCol="1" spcCol="1270" anchor="ctr" anchorCtr="0">
+        <a:bodyPr spcFirstLastPara="0" vert="horz" wrap="square" lIns="49530" tIns="49530" rIns="49530" bIns="49530" numCol="1" spcCol="1270" anchor="ctr" anchorCtr="0">
           <a:noAutofit/>
         </a:bodyPr>
         <a:lstStyle/>
         <a:p>
-          <a:pPr lvl="0" algn="ctr" defTabSz="755650">
+          <a:pPr lvl="0" algn="ctr" defTabSz="577850">
             <a:lnSpc>
               <a:spcPct val="90000"/>
             </a:lnSpc>
@@ -11421,10 +11440,10 @@
             </a:spcAft>
           </a:pPr>
           <a:r>
-            <a:rPr lang="en-US" sz="1700" kern="1200" dirty="0" smtClean="0"/>
+            <a:rPr lang="en-US" sz="1300" kern="1200" dirty="0" smtClean="0"/>
             <a:t>main() start</a:t>
           </a:r>
-          <a:endParaRPr lang="en-US" sz="1700" kern="1200" dirty="0"/>
+          <a:endParaRPr lang="en-US" sz="1300" kern="1200" dirty="0"/>
         </a:p>
       </dsp:txBody>
       <dsp:txXfrm>
@@ -11482,7 +11501,7 @@
         </a:bodyPr>
         <a:lstStyle/>
         <a:p>
-          <a:pPr lvl="0" algn="ctr" defTabSz="622300">
+          <a:pPr lvl="0" algn="ctr" defTabSz="488950">
             <a:lnSpc>
               <a:spcPct val="90000"/>
             </a:lnSpc>
@@ -11493,7 +11512,7 @@
               <a:spcPct val="35000"/>
             </a:spcAft>
           </a:pPr>
-          <a:endParaRPr lang="en-US" sz="1400" kern="1200"/>
+          <a:endParaRPr lang="en-US" sz="1100" kern="1200"/>
         </a:p>
       </dsp:txBody>
       <dsp:txXfrm>
@@ -11553,12 +11572,12 @@
         </a:fontRef>
       </dsp:style>
       <dsp:txBody>
-        <a:bodyPr spcFirstLastPara="0" vert="horz" wrap="square" lIns="64770" tIns="64770" rIns="64770" bIns="64770" numCol="1" spcCol="1270" anchor="t" anchorCtr="0">
+        <a:bodyPr spcFirstLastPara="0" vert="horz" wrap="square" lIns="49530" tIns="49530" rIns="49530" bIns="49530" numCol="1" spcCol="1270" anchor="t" anchorCtr="0">
           <a:noAutofit/>
         </a:bodyPr>
         <a:lstStyle/>
         <a:p>
-          <a:pPr lvl="0" algn="l" defTabSz="755650">
+          <a:pPr lvl="0" algn="l" defTabSz="577850">
             <a:lnSpc>
               <a:spcPct val="90000"/>
             </a:lnSpc>
@@ -11570,13 +11589,13 @@
             </a:spcAft>
           </a:pPr>
           <a:r>
-            <a:rPr lang="en-US" sz="1700" kern="1200" dirty="0" smtClean="0"/>
+            <a:rPr lang="en-US" sz="1300" kern="1200" dirty="0" smtClean="0"/>
             <a:t>Setup</a:t>
           </a:r>
-          <a:endParaRPr lang="en-US" sz="1700" kern="1200" dirty="0"/>
-        </a:p>
-        <a:p>
-          <a:pPr marL="114300" lvl="1" indent="-114300" algn="l" defTabSz="577850">
+          <a:endParaRPr lang="en-US" sz="1300" kern="1200" dirty="0"/>
+        </a:p>
+        <a:p>
+          <a:pPr marL="57150" lvl="1" indent="-57150" algn="l" defTabSz="444500">
             <a:lnSpc>
               <a:spcPct val="90000"/>
             </a:lnSpc>
@@ -11589,13 +11608,13 @@
             <a:buChar char="••"/>
           </a:pPr>
           <a:r>
-            <a:rPr lang="en-US" sz="1300" kern="1200" dirty="0" smtClean="0"/>
+            <a:rPr lang="en-US" sz="1000" kern="1200" dirty="0" smtClean="0"/>
             <a:t>Audio</a:t>
           </a:r>
-          <a:endParaRPr lang="en-US" sz="1300" kern="1200" dirty="0"/>
-        </a:p>
-        <a:p>
-          <a:pPr marL="114300" lvl="1" indent="-114300" algn="l" defTabSz="577850">
+          <a:endParaRPr lang="en-US" sz="1000" kern="1200" dirty="0"/>
+        </a:p>
+        <a:p>
+          <a:pPr marL="57150" lvl="1" indent="-57150" algn="l" defTabSz="444500">
             <a:lnSpc>
               <a:spcPct val="90000"/>
             </a:lnSpc>
@@ -11608,10 +11627,10 @@
             <a:buChar char="••"/>
           </a:pPr>
           <a:r>
-            <a:rPr lang="en-US" sz="1300" kern="1200" dirty="0" smtClean="0"/>
+            <a:rPr lang="en-US" sz="1000" kern="1200" dirty="0" smtClean="0"/>
             <a:t>Bluetooth </a:t>
           </a:r>
-          <a:endParaRPr lang="en-US" sz="1300" kern="1200" dirty="0"/>
+          <a:endParaRPr lang="en-US" sz="1000" kern="1200" dirty="0"/>
         </a:p>
       </dsp:txBody>
       <dsp:txXfrm>
@@ -11669,7 +11688,7 @@
         </a:bodyPr>
         <a:lstStyle/>
         <a:p>
-          <a:pPr lvl="0" algn="ctr" defTabSz="622300">
+          <a:pPr lvl="0" algn="ctr" defTabSz="488950">
             <a:lnSpc>
               <a:spcPct val="90000"/>
             </a:lnSpc>
@@ -11680,7 +11699,7 @@
               <a:spcPct val="35000"/>
             </a:spcAft>
           </a:pPr>
-          <a:endParaRPr lang="en-US" sz="1400" kern="1200"/>
+          <a:endParaRPr lang="en-US" sz="1100" kern="1200"/>
         </a:p>
       </dsp:txBody>
       <dsp:txXfrm>
@@ -11740,12 +11759,12 @@
         </a:fontRef>
       </dsp:style>
       <dsp:txBody>
-        <a:bodyPr spcFirstLastPara="0" vert="horz" wrap="square" lIns="64770" tIns="64770" rIns="64770" bIns="64770" numCol="1" spcCol="1270" anchor="ctr" anchorCtr="0">
+        <a:bodyPr spcFirstLastPara="0" vert="horz" wrap="square" lIns="49530" tIns="49530" rIns="49530" bIns="49530" numCol="1" spcCol="1270" anchor="ctr" anchorCtr="0">
           <a:noAutofit/>
         </a:bodyPr>
         <a:lstStyle/>
         <a:p>
-          <a:pPr lvl="0" algn="ctr" defTabSz="755650">
+          <a:pPr lvl="0" algn="ctr" defTabSz="577850">
             <a:lnSpc>
               <a:spcPct val="90000"/>
             </a:lnSpc>
@@ -11757,10 +11776,10 @@
             </a:spcAft>
           </a:pPr>
           <a:r>
-            <a:rPr lang="en-US" sz="1700" kern="1200" dirty="0" smtClean="0"/>
+            <a:rPr lang="en-US" sz="1300" kern="1200" dirty="0" smtClean="0"/>
             <a:t>Power BP Machine on</a:t>
           </a:r>
-          <a:endParaRPr lang="en-US" sz="1700" kern="1200" dirty="0"/>
+          <a:endParaRPr lang="en-US" sz="1300" kern="1200" dirty="0"/>
         </a:p>
       </dsp:txBody>
       <dsp:txXfrm>
@@ -11818,7 +11837,7 @@
         </a:bodyPr>
         <a:lstStyle/>
         <a:p>
-          <a:pPr lvl="0" algn="ctr" defTabSz="622300">
+          <a:pPr lvl="0" algn="ctr" defTabSz="488950">
             <a:lnSpc>
               <a:spcPct val="90000"/>
             </a:lnSpc>
@@ -11829,7 +11848,7 @@
               <a:spcPct val="35000"/>
             </a:spcAft>
           </a:pPr>
-          <a:endParaRPr lang="en-US" sz="1400" kern="1200"/>
+          <a:endParaRPr lang="en-US" sz="1100" kern="1200"/>
         </a:p>
       </dsp:txBody>
       <dsp:txXfrm>
@@ -11889,12 +11908,12 @@
         </a:fontRef>
       </dsp:style>
       <dsp:txBody>
-        <a:bodyPr spcFirstLastPara="0" vert="horz" wrap="square" lIns="64770" tIns="64770" rIns="64770" bIns="64770" numCol="1" spcCol="1270" anchor="ctr" anchorCtr="0">
+        <a:bodyPr spcFirstLastPara="0" vert="horz" wrap="square" lIns="49530" tIns="49530" rIns="49530" bIns="49530" numCol="1" spcCol="1270" anchor="ctr" anchorCtr="0">
           <a:noAutofit/>
         </a:bodyPr>
         <a:lstStyle/>
         <a:p>
-          <a:pPr lvl="0" algn="ctr" defTabSz="755650">
+          <a:pPr lvl="0" algn="ctr" defTabSz="577850">
             <a:lnSpc>
               <a:spcPct val="90000"/>
             </a:lnSpc>
@@ -11906,10 +11925,10 @@
             </a:spcAft>
           </a:pPr>
           <a:r>
-            <a:rPr lang="en-US" sz="1700" kern="1200" dirty="0" smtClean="0"/>
+            <a:rPr lang="en-US" sz="1300" kern="1200" dirty="0" smtClean="0"/>
             <a:t>Initialize SpO2, Scale, Temperature module</a:t>
           </a:r>
-          <a:endParaRPr lang="en-US" sz="1700" kern="1200" dirty="0"/>
+          <a:endParaRPr lang="en-US" sz="1300" kern="1200" dirty="0"/>
         </a:p>
       </dsp:txBody>
       <dsp:txXfrm>
@@ -11967,7 +11986,7 @@
         </a:bodyPr>
         <a:lstStyle/>
         <a:p>
-          <a:pPr lvl="0" algn="ctr" defTabSz="622300">
+          <a:pPr lvl="0" algn="ctr" defTabSz="488950">
             <a:lnSpc>
               <a:spcPct val="90000"/>
             </a:lnSpc>
@@ -11978,7 +11997,7 @@
               <a:spcPct val="35000"/>
             </a:spcAft>
           </a:pPr>
-          <a:endParaRPr lang="en-US" sz="1400" kern="1200"/>
+          <a:endParaRPr lang="en-US" sz="1100" kern="1200"/>
         </a:p>
       </dsp:txBody>
       <dsp:txXfrm rot="-5400000">
@@ -12038,12 +12057,12 @@
         </a:fontRef>
       </dsp:style>
       <dsp:txBody>
-        <a:bodyPr spcFirstLastPara="0" vert="horz" wrap="square" lIns="64770" tIns="64770" rIns="64770" bIns="64770" numCol="1" spcCol="1270" anchor="ctr" anchorCtr="0">
+        <a:bodyPr spcFirstLastPara="0" vert="horz" wrap="square" lIns="49530" tIns="49530" rIns="49530" bIns="49530" numCol="1" spcCol="1270" anchor="ctr" anchorCtr="0">
           <a:noAutofit/>
         </a:bodyPr>
         <a:lstStyle/>
         <a:p>
-          <a:pPr lvl="0" algn="ctr" defTabSz="755650">
+          <a:pPr lvl="0" algn="ctr" defTabSz="577850">
             <a:lnSpc>
               <a:spcPct val="90000"/>
             </a:lnSpc>
@@ -12055,7 +12074,7 @@
             </a:spcAft>
           </a:pPr>
           <a:r>
-            <a:rPr lang="en-US" sz="1700" kern="1200" dirty="0" smtClean="0"/>
+            <a:rPr lang="en-US" sz="1300" kern="1200" dirty="0" smtClean="0"/>
             <a:t>Setup touch </a:t>
           </a:r>
         </a:p>
@@ -12115,7 +12134,7 @@
         </a:bodyPr>
         <a:lstStyle/>
         <a:p>
-          <a:pPr lvl="0" algn="ctr" defTabSz="622300">
+          <a:pPr lvl="0" algn="ctr" defTabSz="488950">
             <a:lnSpc>
               <a:spcPct val="90000"/>
             </a:lnSpc>
@@ -12126,7 +12145,7 @@
               <a:spcPct val="35000"/>
             </a:spcAft>
           </a:pPr>
-          <a:endParaRPr lang="en-US" sz="1400" kern="1200"/>
+          <a:endParaRPr lang="en-US" sz="1100" kern="1200"/>
         </a:p>
       </dsp:txBody>
       <dsp:txXfrm rot="10800000">
@@ -12134,7 +12153,7 @@
         <a:ext cx="278476" cy="279226"/>
       </dsp:txXfrm>
     </dsp:sp>
-    <dsp:sp modelId="{6BFB2FC8-D0D9-4EF7-88E7-53C32EB04ED2}">
+    <dsp:sp modelId="{9038EBA2-D570-4040-AD91-DE80216ABD27}">
       <dsp:nvSpPr>
         <dsp:cNvPr id="0" name=""/>
         <dsp:cNvSpPr/>
@@ -12186,12 +12205,12 @@
         </a:fontRef>
       </dsp:style>
       <dsp:txBody>
-        <a:bodyPr spcFirstLastPara="0" vert="horz" wrap="square" lIns="64770" tIns="64770" rIns="64770" bIns="64770" numCol="1" spcCol="1270" anchor="ctr" anchorCtr="0">
+        <a:bodyPr spcFirstLastPara="0" vert="horz" wrap="square" lIns="49530" tIns="49530" rIns="49530" bIns="49530" numCol="1" spcCol="1270" anchor="t" anchorCtr="0">
           <a:noAutofit/>
         </a:bodyPr>
         <a:lstStyle/>
         <a:p>
-          <a:pPr lvl="0" algn="ctr" defTabSz="755650">
+          <a:pPr lvl="0" algn="l" defTabSz="577850">
             <a:lnSpc>
               <a:spcPct val="90000"/>
             </a:lnSpc>
@@ -12202,9 +12221,78 @@
               <a:spcPct val="35000"/>
             </a:spcAft>
           </a:pPr>
+          <a:endParaRPr lang="en-US" sz="1300" kern="1200" dirty="0" smtClean="0"/>
+        </a:p>
+        <a:p>
+          <a:pPr marL="57150" lvl="1" indent="-57150" algn="l" defTabSz="444500">
+            <a:lnSpc>
+              <a:spcPct val="90000"/>
+            </a:lnSpc>
+            <a:spcBef>
+              <a:spcPct val="0"/>
+            </a:spcBef>
+            <a:spcAft>
+              <a:spcPct val="15000"/>
+            </a:spcAft>
+            <a:buChar char="••"/>
+          </a:pPr>
           <a:r>
-            <a:rPr lang="en-US" sz="1700" kern="1200" dirty="0" smtClean="0"/>
+            <a:rPr lang="en-US" sz="1000" kern="1200" dirty="0" smtClean="0"/>
             <a:t>Uno measures height</a:t>
+          </a:r>
+        </a:p>
+        <a:p>
+          <a:pPr marL="57150" lvl="1" indent="-57150" algn="l" defTabSz="444500">
+            <a:lnSpc>
+              <a:spcPct val="90000"/>
+            </a:lnSpc>
+            <a:spcBef>
+              <a:spcPct val="0"/>
+            </a:spcBef>
+            <a:spcAft>
+              <a:spcPct val="15000"/>
+            </a:spcAft>
+            <a:buChar char="••"/>
+          </a:pPr>
+          <a:r>
+            <a:rPr lang="en-US" sz="1000" kern="1200" dirty="0" smtClean="0"/>
+            <a:t>Pi measures</a:t>
+          </a:r>
+        </a:p>
+        <a:p>
+          <a:pPr marL="114300" lvl="2" indent="-57150" algn="l" defTabSz="444500">
+            <a:lnSpc>
+              <a:spcPct val="90000"/>
+            </a:lnSpc>
+            <a:spcBef>
+              <a:spcPct val="0"/>
+            </a:spcBef>
+            <a:spcAft>
+              <a:spcPct val="15000"/>
+            </a:spcAft>
+            <a:buChar char="••"/>
+          </a:pPr>
+          <a:r>
+            <a:rPr lang="en-US" sz="1000" kern="1200" dirty="0" smtClean="0"/>
+            <a:t>Scale</a:t>
+          </a:r>
+        </a:p>
+        <a:p>
+          <a:pPr marL="114300" lvl="2" indent="-57150" algn="l" defTabSz="444500">
+            <a:lnSpc>
+              <a:spcPct val="90000"/>
+            </a:lnSpc>
+            <a:spcBef>
+              <a:spcPct val="0"/>
+            </a:spcBef>
+            <a:spcAft>
+              <a:spcPct val="15000"/>
+            </a:spcAft>
+            <a:buChar char="••"/>
+          </a:pPr>
+          <a:r>
+            <a:rPr lang="en-US" sz="1000" kern="1200" dirty="0" smtClean="0"/>
+            <a:t>Temperature</a:t>
           </a:r>
         </a:p>
       </dsp:txBody>
@@ -12213,7 +12301,7 @@
         <a:ext cx="1810573" cy="1059962"/>
       </dsp:txXfrm>
     </dsp:sp>
-    <dsp:sp modelId="{0795C1ED-6176-4D71-8695-BFA260CD8DB5}">
+    <dsp:sp modelId="{604B6F34-710D-40C8-8805-5FC71845512E}">
       <dsp:nvSpPr>
         <dsp:cNvPr id="0" name=""/>
         <dsp:cNvSpPr/>
@@ -12263,7 +12351,7 @@
         </a:bodyPr>
         <a:lstStyle/>
         <a:p>
-          <a:pPr lvl="0" algn="ctr" defTabSz="622300">
+          <a:pPr lvl="0" algn="ctr" defTabSz="488950">
             <a:lnSpc>
               <a:spcPct val="90000"/>
             </a:lnSpc>
@@ -12274,7 +12362,7 @@
               <a:spcPct val="35000"/>
             </a:spcAft>
           </a:pPr>
-          <a:endParaRPr lang="en-US" sz="1400" kern="1200"/>
+          <a:endParaRPr lang="en-US" sz="1100" kern="1200"/>
         </a:p>
       </dsp:txBody>
       <dsp:txXfrm rot="10800000">
@@ -12282,7 +12370,7 @@
         <a:ext cx="278476" cy="279226"/>
       </dsp:txXfrm>
     </dsp:sp>
-    <dsp:sp modelId="{7202BC0E-BCCD-4749-B8AE-EAEB96710794}">
+    <dsp:sp modelId="{99A2F953-EC43-4E7D-895E-E6CCB05BF9AC}">
       <dsp:nvSpPr>
         <dsp:cNvPr id="0" name=""/>
         <dsp:cNvSpPr/>
@@ -12334,12 +12422,12 @@
         </a:fontRef>
       </dsp:style>
       <dsp:txBody>
-        <a:bodyPr spcFirstLastPara="0" vert="horz" wrap="square" lIns="64770" tIns="64770" rIns="64770" bIns="64770" numCol="1" spcCol="1270" anchor="t" anchorCtr="0">
+        <a:bodyPr spcFirstLastPara="0" vert="horz" wrap="square" lIns="49530" tIns="49530" rIns="49530" bIns="49530" numCol="1" spcCol="1270" anchor="ctr" anchorCtr="0">
           <a:noAutofit/>
         </a:bodyPr>
         <a:lstStyle/>
         <a:p>
-          <a:pPr lvl="0" algn="l" defTabSz="755650">
+          <a:pPr lvl="0" algn="ctr" defTabSz="577850">
             <a:lnSpc>
               <a:spcPct val="90000"/>
             </a:lnSpc>
@@ -12351,52 +12439,9 @@
             </a:spcAft>
           </a:pPr>
           <a:r>
-            <a:rPr lang="en-US" sz="1700" kern="1200" dirty="0" smtClean="0"/>
-            <a:t>Pi </a:t>
+            <a:rPr lang="en-US" sz="1300" kern="1200" dirty="0" smtClean="0"/>
+            <a:t>Pi measures SpO2</a:t>
           </a:r>
-          <a:r>
-            <a:rPr lang="en-US" sz="1700" kern="1200" dirty="0" smtClean="0"/>
-            <a:t>measures</a:t>
-          </a:r>
-          <a:endParaRPr lang="en-US" sz="1700" kern="1200" dirty="0" smtClean="0"/>
-        </a:p>
-        <a:p>
-          <a:pPr marL="114300" lvl="1" indent="-114300" algn="l" defTabSz="577850">
-            <a:lnSpc>
-              <a:spcPct val="90000"/>
-            </a:lnSpc>
-            <a:spcBef>
-              <a:spcPct val="0"/>
-            </a:spcBef>
-            <a:spcAft>
-              <a:spcPct val="15000"/>
-            </a:spcAft>
-            <a:buChar char="••"/>
-          </a:pPr>
-          <a:r>
-            <a:rPr lang="en-US" sz="1300" kern="1200" dirty="0" smtClean="0"/>
-            <a:t>Scale</a:t>
-          </a:r>
-          <a:endParaRPr lang="en-US" sz="1300" kern="1200" dirty="0" smtClean="0"/>
-        </a:p>
-        <a:p>
-          <a:pPr marL="114300" lvl="1" indent="-114300" algn="l" defTabSz="577850">
-            <a:lnSpc>
-              <a:spcPct val="90000"/>
-            </a:lnSpc>
-            <a:spcBef>
-              <a:spcPct val="0"/>
-            </a:spcBef>
-            <a:spcAft>
-              <a:spcPct val="15000"/>
-            </a:spcAft>
-            <a:buChar char="••"/>
-          </a:pPr>
-          <a:r>
-            <a:rPr lang="en-US" sz="1300" kern="1200" dirty="0" smtClean="0"/>
-            <a:t>Temperature</a:t>
-          </a:r>
-          <a:endParaRPr lang="en-US" sz="1300" kern="1200" dirty="0" smtClean="0"/>
         </a:p>
       </dsp:txBody>
       <dsp:txXfrm>
@@ -12404,7 +12449,7 @@
         <a:ext cx="1810573" cy="1059962"/>
       </dsp:txXfrm>
     </dsp:sp>
-    <dsp:sp modelId="{28D40CE1-835B-4A7B-8244-943B63DB6594}">
+    <dsp:sp modelId="{B0605081-2CC9-4157-A707-056A7E67F165}">
       <dsp:nvSpPr>
         <dsp:cNvPr id="0" name=""/>
         <dsp:cNvSpPr/>
@@ -12454,7 +12499,7 @@
         </a:bodyPr>
         <a:lstStyle/>
         <a:p>
-          <a:pPr lvl="0" algn="ctr" defTabSz="622300">
+          <a:pPr lvl="0" algn="ctr" defTabSz="488950">
             <a:lnSpc>
               <a:spcPct val="90000"/>
             </a:lnSpc>
@@ -12465,7 +12510,7 @@
               <a:spcPct val="35000"/>
             </a:spcAft>
           </a:pPr>
-          <a:endParaRPr lang="en-US" sz="1400" kern="1200"/>
+          <a:endParaRPr lang="en-US" sz="1100" kern="1200"/>
         </a:p>
       </dsp:txBody>
       <dsp:txXfrm rot="10800000">
@@ -12473,7 +12518,7 @@
         <a:ext cx="278476" cy="279226"/>
       </dsp:txXfrm>
     </dsp:sp>
-    <dsp:sp modelId="{99A2F953-EC43-4E7D-895E-E6CCB05BF9AC}">
+    <dsp:sp modelId="{56040DE5-8429-4ADC-872E-25108EC0DBDB}">
       <dsp:nvSpPr>
         <dsp:cNvPr id="0" name=""/>
         <dsp:cNvSpPr/>
@@ -12525,12 +12570,12 @@
         </a:fontRef>
       </dsp:style>
       <dsp:txBody>
-        <a:bodyPr spcFirstLastPara="0" vert="horz" wrap="square" lIns="64770" tIns="64770" rIns="64770" bIns="64770" numCol="1" spcCol="1270" anchor="ctr" anchorCtr="0">
+        <a:bodyPr spcFirstLastPara="0" vert="horz" wrap="square" lIns="49530" tIns="49530" rIns="49530" bIns="49530" numCol="1" spcCol="1270" anchor="ctr" anchorCtr="0">
           <a:noAutofit/>
         </a:bodyPr>
         <a:lstStyle/>
         <a:p>
-          <a:pPr lvl="0" algn="ctr" defTabSz="755650">
+          <a:pPr lvl="0" algn="ctr" defTabSz="577850">
             <a:lnSpc>
               <a:spcPct val="90000"/>
             </a:lnSpc>
@@ -12542,10 +12587,9 @@
             </a:spcAft>
           </a:pPr>
           <a:r>
-            <a:rPr lang="en-US" sz="1700" kern="1200" dirty="0" smtClean="0"/>
-            <a:t>Pi measures SpO2</a:t>
+            <a:rPr lang="en-US" sz="1300" kern="1200" dirty="0" smtClean="0"/>
+            <a:t>Get blood pressure result</a:t>
           </a:r>
-          <a:endParaRPr lang="en-US" sz="1700" kern="1200" dirty="0" smtClean="0"/>
         </a:p>
       </dsp:txBody>
       <dsp:txXfrm>
@@ -12553,7 +12597,7 @@
         <a:ext cx="1810573" cy="1059962"/>
       </dsp:txXfrm>
     </dsp:sp>
-    <dsp:sp modelId="{B0605081-2CC9-4157-A707-056A7E67F165}">
+    <dsp:sp modelId="{8875B72C-833D-4C06-88C7-8621517377BC}">
       <dsp:nvSpPr>
         <dsp:cNvPr id="0" name=""/>
         <dsp:cNvSpPr/>
@@ -12603,7 +12647,7 @@
         </a:bodyPr>
         <a:lstStyle/>
         <a:p>
-          <a:pPr lvl="0" algn="ctr" defTabSz="622300">
+          <a:pPr lvl="0" algn="ctr" defTabSz="488950">
             <a:lnSpc>
               <a:spcPct val="90000"/>
             </a:lnSpc>
@@ -12614,7 +12658,7 @@
               <a:spcPct val="35000"/>
             </a:spcAft>
           </a:pPr>
-          <a:endParaRPr lang="en-US" sz="1400" kern="1200"/>
+          <a:endParaRPr lang="en-US" sz="1100" kern="1200"/>
         </a:p>
       </dsp:txBody>
       <dsp:txXfrm rot="-5400000">
@@ -12622,7 +12666,7 @@
         <a:ext cx="279226" cy="278476"/>
       </dsp:txXfrm>
     </dsp:sp>
-    <dsp:sp modelId="{56040DE5-8429-4ADC-872E-25108EC0DBDB}">
+    <dsp:sp modelId="{202B8E42-56EC-4F6F-B287-6BFE3E8911D1}">
       <dsp:nvSpPr>
         <dsp:cNvPr id="0" name=""/>
         <dsp:cNvSpPr/>
@@ -12674,12 +12718,12 @@
         </a:fontRef>
       </dsp:style>
       <dsp:txBody>
-        <a:bodyPr spcFirstLastPara="0" vert="horz" wrap="square" lIns="64770" tIns="64770" rIns="64770" bIns="64770" numCol="1" spcCol="1270" anchor="ctr" anchorCtr="0">
+        <a:bodyPr spcFirstLastPara="0" vert="horz" wrap="square" lIns="49530" tIns="49530" rIns="49530" bIns="49530" numCol="1" spcCol="1270" anchor="ctr" anchorCtr="0">
           <a:noAutofit/>
         </a:bodyPr>
         <a:lstStyle/>
         <a:p>
-          <a:pPr lvl="0" algn="ctr" defTabSz="755650">
+          <a:pPr lvl="0" algn="ctr" defTabSz="577850">
             <a:lnSpc>
               <a:spcPct val="90000"/>
             </a:lnSpc>
@@ -12691,18 +12735,9 @@
             </a:spcAft>
           </a:pPr>
           <a:r>
-            <a:rPr lang="en-US" sz="1700" kern="1200" dirty="0" smtClean="0"/>
-            <a:t>Get </a:t>
+            <a:rPr lang="en-US" sz="1300" kern="1200" dirty="0" smtClean="0"/>
+            <a:t>Prepare outputs</a:t>
           </a:r>
-          <a:r>
-            <a:rPr lang="en-US" sz="1700" kern="1200" dirty="0" smtClean="0"/>
-            <a:t>blood </a:t>
-          </a:r>
-          <a:r>
-            <a:rPr lang="en-US" sz="1700" kern="1200" dirty="0" smtClean="0"/>
-            <a:t>pressure result</a:t>
-          </a:r>
-          <a:endParaRPr lang="en-US" sz="1700" kern="1200" dirty="0" smtClean="0"/>
         </a:p>
       </dsp:txBody>
       <dsp:txXfrm>
@@ -12710,7 +12745,7 @@
         <a:ext cx="1810573" cy="1059962"/>
       </dsp:txXfrm>
     </dsp:sp>
-    <dsp:sp modelId="{8875B72C-833D-4C06-88C7-8621517377BC}">
+    <dsp:sp modelId="{F5157131-9131-47E0-91C7-C2708EA7DF4E}">
       <dsp:nvSpPr>
         <dsp:cNvPr id="0" name=""/>
         <dsp:cNvSpPr/>
@@ -12760,7 +12795,7 @@
         </a:bodyPr>
         <a:lstStyle/>
         <a:p>
-          <a:pPr lvl="0" algn="ctr" defTabSz="622300">
+          <a:pPr lvl="0" algn="ctr" defTabSz="488950">
             <a:lnSpc>
               <a:spcPct val="90000"/>
             </a:lnSpc>
@@ -12771,7 +12806,7 @@
               <a:spcPct val="35000"/>
             </a:spcAft>
           </a:pPr>
-          <a:endParaRPr lang="en-US" sz="1400" kern="1200"/>
+          <a:endParaRPr lang="en-US" sz="1100" kern="1200"/>
         </a:p>
       </dsp:txBody>
       <dsp:txXfrm>
@@ -12779,7 +12814,7 @@
         <a:ext cx="278476" cy="279226"/>
       </dsp:txXfrm>
     </dsp:sp>
-    <dsp:sp modelId="{202B8E42-56EC-4F6F-B287-6BFE3E8911D1}">
+    <dsp:sp modelId="{89DADE2F-0EC1-44A0-92D9-021DF56E312B}">
       <dsp:nvSpPr>
         <dsp:cNvPr id="0" name=""/>
         <dsp:cNvSpPr/>
@@ -12831,12 +12866,12 @@
         </a:fontRef>
       </dsp:style>
       <dsp:txBody>
-        <a:bodyPr spcFirstLastPara="0" vert="horz" wrap="square" lIns="64770" tIns="64770" rIns="64770" bIns="64770" numCol="1" spcCol="1270" anchor="ctr" anchorCtr="0">
+        <a:bodyPr spcFirstLastPara="0" vert="horz" wrap="square" lIns="49530" tIns="49530" rIns="49530" bIns="49530" numCol="1" spcCol="1270" anchor="ctr" anchorCtr="0">
           <a:noAutofit/>
         </a:bodyPr>
         <a:lstStyle/>
         <a:p>
-          <a:pPr lvl="0" algn="ctr" defTabSz="755650">
+          <a:pPr lvl="0" algn="ctr" defTabSz="577850">
             <a:lnSpc>
               <a:spcPct val="90000"/>
             </a:lnSpc>
@@ -12848,10 +12883,9 @@
             </a:spcAft>
           </a:pPr>
           <a:r>
-            <a:rPr lang="en-US" sz="1700" kern="1200" dirty="0" smtClean="0"/>
-            <a:t>Prepare outputs</a:t>
+            <a:rPr lang="en-US" sz="1300" kern="1200" dirty="0" smtClean="0"/>
+            <a:t>Send data to server</a:t>
           </a:r>
-          <a:endParaRPr lang="en-US" sz="1700" kern="1200" dirty="0" smtClean="0"/>
         </a:p>
       </dsp:txBody>
       <dsp:txXfrm>
@@ -12859,7 +12893,7 @@
         <a:ext cx="1810573" cy="1059962"/>
       </dsp:txXfrm>
     </dsp:sp>
-    <dsp:sp modelId="{F5157131-9131-47E0-91C7-C2708EA7DF4E}">
+    <dsp:sp modelId="{CD0FEDB8-BCC7-4F7B-BCF9-F14D929D684E}">
       <dsp:nvSpPr>
         <dsp:cNvPr id="0" name=""/>
         <dsp:cNvSpPr/>
@@ -12909,7 +12943,7 @@
         </a:bodyPr>
         <a:lstStyle/>
         <a:p>
-          <a:pPr lvl="0" algn="ctr" defTabSz="622300">
+          <a:pPr lvl="0" algn="ctr" defTabSz="488950">
             <a:lnSpc>
               <a:spcPct val="90000"/>
             </a:lnSpc>
@@ -12920,7 +12954,7 @@
               <a:spcPct val="35000"/>
             </a:spcAft>
           </a:pPr>
-          <a:endParaRPr lang="en-US" sz="1400" kern="1200"/>
+          <a:endParaRPr lang="en-US" sz="1100" kern="1200"/>
         </a:p>
       </dsp:txBody>
       <dsp:txXfrm>
@@ -12928,7 +12962,7 @@
         <a:ext cx="278476" cy="279226"/>
       </dsp:txXfrm>
     </dsp:sp>
-    <dsp:sp modelId="{89DADE2F-0EC1-44A0-92D9-021DF56E312B}">
+    <dsp:sp modelId="{C269A2E3-8621-4697-96C7-19DDAF8DBEF2}">
       <dsp:nvSpPr>
         <dsp:cNvPr id="0" name=""/>
         <dsp:cNvSpPr/>
@@ -12980,12 +13014,12 @@
         </a:fontRef>
       </dsp:style>
       <dsp:txBody>
-        <a:bodyPr spcFirstLastPara="0" vert="horz" wrap="square" lIns="64770" tIns="64770" rIns="64770" bIns="64770" numCol="1" spcCol="1270" anchor="ctr" anchorCtr="0">
+        <a:bodyPr spcFirstLastPara="0" vert="horz" wrap="square" lIns="49530" tIns="49530" rIns="49530" bIns="49530" numCol="1" spcCol="1270" anchor="ctr" anchorCtr="0">
           <a:noAutofit/>
         </a:bodyPr>
         <a:lstStyle/>
         <a:p>
-          <a:pPr lvl="0" algn="ctr" defTabSz="755650">
+          <a:pPr lvl="0" algn="ctr" defTabSz="577850">
             <a:lnSpc>
               <a:spcPct val="90000"/>
             </a:lnSpc>
@@ -12997,161 +13031,13 @@
             </a:spcAft>
           </a:pPr>
           <a:r>
-            <a:rPr lang="en-US" sz="1700" kern="1200" dirty="0" smtClean="0"/>
-            <a:t>Send data to server</a:t>
+            <a:rPr lang="en-US" sz="1300" kern="1200" dirty="0" smtClean="0"/>
+            <a:t>END</a:t>
           </a:r>
         </a:p>
       </dsp:txBody>
       <dsp:txXfrm>
         <a:off x="5961937" y="3786996"/>
-        <a:ext cx="1810573" cy="1059962"/>
-      </dsp:txXfrm>
-    </dsp:sp>
-    <dsp:sp modelId="{CD0FEDB8-BCC7-4F7B-BCF9-F14D929D684E}">
-      <dsp:nvSpPr>
-        <dsp:cNvPr id="0" name=""/>
-        <dsp:cNvSpPr/>
-      </dsp:nvSpPr>
-      <dsp:spPr>
-        <a:xfrm>
-          <a:off x="7970623" y="4084288"/>
-          <a:ext cx="397823" cy="465378"/>
-        </a:xfrm>
-        <a:prstGeom prst="rightArrow">
-          <a:avLst>
-            <a:gd name="adj1" fmla="val 60000"/>
-            <a:gd name="adj2" fmla="val 50000"/>
-          </a:avLst>
-        </a:prstGeom>
-        <a:solidFill>
-          <a:schemeClr val="accent1">
-            <a:tint val="60000"/>
-            <a:hueOff val="0"/>
-            <a:satOff val="0"/>
-            <a:lumOff val="0"/>
-            <a:alphaOff val="0"/>
-          </a:schemeClr>
-        </a:solidFill>
-        <a:ln>
-          <a:noFill/>
-        </a:ln>
-        <a:effectLst/>
-      </dsp:spPr>
-      <dsp:style>
-        <a:lnRef idx="0">
-          <a:scrgbClr r="0" g="0" b="0"/>
-        </a:lnRef>
-        <a:fillRef idx="1">
-          <a:scrgbClr r="0" g="0" b="0"/>
-        </a:fillRef>
-        <a:effectRef idx="0">
-          <a:scrgbClr r="0" g="0" b="0"/>
-        </a:effectRef>
-        <a:fontRef idx="minor">
-          <a:schemeClr val="lt1"/>
-        </a:fontRef>
-      </dsp:style>
-      <dsp:txBody>
-        <a:bodyPr spcFirstLastPara="0" vert="horz" wrap="square" lIns="0" tIns="0" rIns="0" bIns="0" numCol="1" spcCol="1270" anchor="ctr" anchorCtr="0">
-          <a:noAutofit/>
-        </a:bodyPr>
-        <a:lstStyle/>
-        <a:p>
-          <a:pPr lvl="0" algn="ctr" defTabSz="622300">
-            <a:lnSpc>
-              <a:spcPct val="90000"/>
-            </a:lnSpc>
-            <a:spcBef>
-              <a:spcPct val="0"/>
-            </a:spcBef>
-            <a:spcAft>
-              <a:spcPct val="35000"/>
-            </a:spcAft>
-          </a:pPr>
-          <a:endParaRPr lang="en-US" sz="1400" kern="1200"/>
-        </a:p>
-      </dsp:txBody>
-      <dsp:txXfrm>
-        <a:off x="7970623" y="4177364"/>
-        <a:ext cx="278476" cy="279226"/>
-      </dsp:txXfrm>
-    </dsp:sp>
-    <dsp:sp modelId="{C269A2E3-8621-4697-96C7-19DDAF8DBEF2}">
-      <dsp:nvSpPr>
-        <dsp:cNvPr id="0" name=""/>
-        <dsp:cNvSpPr/>
-      </dsp:nvSpPr>
-      <dsp:spPr>
-        <a:xfrm>
-          <a:off x="8556099" y="3754019"/>
-          <a:ext cx="1876527" cy="1125916"/>
-        </a:xfrm>
-        <a:prstGeom prst="roundRect">
-          <a:avLst>
-            <a:gd name="adj" fmla="val 10000"/>
-          </a:avLst>
-        </a:prstGeom>
-        <a:solidFill>
-          <a:schemeClr val="accent1">
-            <a:hueOff val="0"/>
-            <a:satOff val="0"/>
-            <a:lumOff val="0"/>
-            <a:alphaOff val="0"/>
-          </a:schemeClr>
-        </a:solidFill>
-        <a:ln w="12700" cap="flat" cmpd="sng" algn="ctr">
-          <a:solidFill>
-            <a:schemeClr val="lt1">
-              <a:hueOff val="0"/>
-              <a:satOff val="0"/>
-              <a:lumOff val="0"/>
-              <a:alphaOff val="0"/>
-            </a:schemeClr>
-          </a:solidFill>
-          <a:prstDash val="solid"/>
-          <a:miter lim="800000"/>
-        </a:ln>
-        <a:effectLst/>
-      </dsp:spPr>
-      <dsp:style>
-        <a:lnRef idx="2">
-          <a:scrgbClr r="0" g="0" b="0"/>
-        </a:lnRef>
-        <a:fillRef idx="1">
-          <a:scrgbClr r="0" g="0" b="0"/>
-        </a:fillRef>
-        <a:effectRef idx="0">
-          <a:scrgbClr r="0" g="0" b="0"/>
-        </a:effectRef>
-        <a:fontRef idx="minor">
-          <a:schemeClr val="lt1"/>
-        </a:fontRef>
-      </dsp:style>
-      <dsp:txBody>
-        <a:bodyPr spcFirstLastPara="0" vert="horz" wrap="square" lIns="64770" tIns="64770" rIns="64770" bIns="64770" numCol="1" spcCol="1270" anchor="ctr" anchorCtr="0">
-          <a:noAutofit/>
-        </a:bodyPr>
-        <a:lstStyle/>
-        <a:p>
-          <a:pPr lvl="0" algn="ctr" defTabSz="755650">
-            <a:lnSpc>
-              <a:spcPct val="90000"/>
-            </a:lnSpc>
-            <a:spcBef>
-              <a:spcPct val="0"/>
-            </a:spcBef>
-            <a:spcAft>
-              <a:spcPct val="35000"/>
-            </a:spcAft>
-          </a:pPr>
-          <a:r>
-            <a:rPr lang="en-US" sz="1700" kern="1200" dirty="0" smtClean="0"/>
-            <a:t>END</a:t>
-          </a:r>
-        </a:p>
-      </dsp:txBody>
-      <dsp:txXfrm>
-        <a:off x="8589076" y="3786996"/>
         <a:ext cx="1810573" cy="1059962"/>
       </dsp:txXfrm>
     </dsp:sp>
@@ -13167,506 +13053,6 @@
       <dsp:cNvGrpSpPr/>
     </dsp:nvGrpSpPr>
     <dsp:grpSpPr/>
-    <dsp:sp modelId="{F2EE8185-ADDA-40B5-821D-4079A686539F}">
-      <dsp:nvSpPr>
-        <dsp:cNvPr id="0" name=""/>
-        <dsp:cNvSpPr/>
-      </dsp:nvSpPr>
-      <dsp:spPr>
-        <a:xfrm>
-          <a:off x="51" y="16698"/>
-          <a:ext cx="4913783" cy="806400"/>
-        </a:xfrm>
-        <a:prstGeom prst="rect">
-          <a:avLst/>
-        </a:prstGeom>
-        <a:solidFill>
-          <a:schemeClr val="accent1">
-            <a:hueOff val="0"/>
-            <a:satOff val="0"/>
-            <a:lumOff val="0"/>
-            <a:alphaOff val="0"/>
-          </a:schemeClr>
-        </a:solidFill>
-        <a:ln w="12700" cap="flat" cmpd="sng" algn="ctr">
-          <a:solidFill>
-            <a:schemeClr val="accent1">
-              <a:hueOff val="0"/>
-              <a:satOff val="0"/>
-              <a:lumOff val="0"/>
-              <a:alphaOff val="0"/>
-            </a:schemeClr>
-          </a:solidFill>
-          <a:prstDash val="solid"/>
-          <a:miter lim="800000"/>
-        </a:ln>
-        <a:effectLst/>
-      </dsp:spPr>
-      <dsp:style>
-        <a:lnRef idx="2">
-          <a:scrgbClr r="0" g="0" b="0"/>
-        </a:lnRef>
-        <a:fillRef idx="1">
-          <a:scrgbClr r="0" g="0" b="0"/>
-        </a:fillRef>
-        <a:effectRef idx="0">
-          <a:scrgbClr r="0" g="0" b="0"/>
-        </a:effectRef>
-        <a:fontRef idx="minor">
-          <a:schemeClr val="lt1"/>
-        </a:fontRef>
-      </dsp:style>
-      <dsp:txBody>
-        <a:bodyPr spcFirstLastPara="0" vert="horz" wrap="square" lIns="199136" tIns="113792" rIns="199136" bIns="113792" numCol="1" spcCol="1270" anchor="ctr" anchorCtr="0">
-          <a:noAutofit/>
-        </a:bodyPr>
-        <a:lstStyle/>
-        <a:p>
-          <a:pPr lvl="0" algn="ctr" defTabSz="1244600">
-            <a:lnSpc>
-              <a:spcPct val="90000"/>
-            </a:lnSpc>
-            <a:spcBef>
-              <a:spcPct val="0"/>
-            </a:spcBef>
-            <a:spcAft>
-              <a:spcPct val="35000"/>
-            </a:spcAft>
-          </a:pPr>
-          <a:r>
-            <a:rPr lang="en-US" sz="2800" kern="1200" dirty="0" smtClean="0"/>
-            <a:t>Server</a:t>
-          </a:r>
-          <a:endParaRPr lang="en-US" sz="2800" kern="1200" dirty="0"/>
-        </a:p>
-      </dsp:txBody>
-      <dsp:txXfrm>
-        <a:off x="51" y="16698"/>
-        <a:ext cx="4913783" cy="806400"/>
-      </dsp:txXfrm>
-    </dsp:sp>
-    <dsp:sp modelId="{50C632A4-B919-46A5-AF1A-30702345ECD3}">
-      <dsp:nvSpPr>
-        <dsp:cNvPr id="0" name=""/>
-        <dsp:cNvSpPr/>
-      </dsp:nvSpPr>
-      <dsp:spPr>
-        <a:xfrm>
-          <a:off x="51" y="823098"/>
-          <a:ext cx="4913783" cy="3511541"/>
-        </a:xfrm>
-        <a:prstGeom prst="rect">
-          <a:avLst/>
-        </a:prstGeom>
-        <a:solidFill>
-          <a:schemeClr val="accent1">
-            <a:alpha val="90000"/>
-            <a:tint val="40000"/>
-            <a:hueOff val="0"/>
-            <a:satOff val="0"/>
-            <a:lumOff val="0"/>
-            <a:alphaOff val="0"/>
-          </a:schemeClr>
-        </a:solidFill>
-        <a:ln w="12700" cap="flat" cmpd="sng" algn="ctr">
-          <a:solidFill>
-            <a:schemeClr val="accent1">
-              <a:alpha val="90000"/>
-              <a:tint val="40000"/>
-              <a:hueOff val="0"/>
-              <a:satOff val="0"/>
-              <a:lumOff val="0"/>
-              <a:alphaOff val="0"/>
-            </a:schemeClr>
-          </a:solidFill>
-          <a:prstDash val="solid"/>
-          <a:miter lim="800000"/>
-        </a:ln>
-        <a:effectLst/>
-      </dsp:spPr>
-      <dsp:style>
-        <a:lnRef idx="2">
-          <a:scrgbClr r="0" g="0" b="0"/>
-        </a:lnRef>
-        <a:fillRef idx="1">
-          <a:scrgbClr r="0" g="0" b="0"/>
-        </a:fillRef>
-        <a:effectRef idx="0">
-          <a:scrgbClr r="0" g="0" b="0"/>
-        </a:effectRef>
-        <a:fontRef idx="minor"/>
-      </dsp:style>
-      <dsp:txBody>
-        <a:bodyPr spcFirstLastPara="0" vert="horz" wrap="square" lIns="149352" tIns="149352" rIns="199136" bIns="224028" numCol="1" spcCol="1270" anchor="t" anchorCtr="0">
-          <a:noAutofit/>
-        </a:bodyPr>
-        <a:lstStyle/>
-        <a:p>
-          <a:pPr marL="285750" lvl="1" indent="-285750" algn="l" defTabSz="1244600">
-            <a:lnSpc>
-              <a:spcPct val="90000"/>
-            </a:lnSpc>
-            <a:spcBef>
-              <a:spcPct val="0"/>
-            </a:spcBef>
-            <a:spcAft>
-              <a:spcPct val="15000"/>
-            </a:spcAft>
-            <a:buChar char="••"/>
-          </a:pPr>
-          <a:r>
-            <a:rPr lang="en-US" sz="2800" kern="1200" dirty="0" smtClean="0"/>
-            <a:t>Handle result from Pi</a:t>
-          </a:r>
-          <a:endParaRPr lang="en-US" sz="2800" kern="1200" dirty="0"/>
-        </a:p>
-        <a:p>
-          <a:pPr marL="285750" lvl="1" indent="-285750" algn="l" defTabSz="1244600">
-            <a:lnSpc>
-              <a:spcPct val="90000"/>
-            </a:lnSpc>
-            <a:spcBef>
-              <a:spcPct val="0"/>
-            </a:spcBef>
-            <a:spcAft>
-              <a:spcPct val="15000"/>
-            </a:spcAft>
-            <a:buChar char="••"/>
-          </a:pPr>
-          <a:r>
-            <a:rPr lang="en-US" sz="2800" kern="1200" dirty="0" smtClean="0"/>
-            <a:t>Store user data (ID, </a:t>
-          </a:r>
-          <a:r>
-            <a:rPr lang="en-US" sz="2800" kern="1200" dirty="0" smtClean="0"/>
-            <a:t>name, mac </a:t>
-          </a:r>
-          <a:r>
-            <a:rPr lang="en-US" sz="2800" kern="1200" dirty="0" err="1" smtClean="0"/>
-            <a:t>addr</a:t>
-          </a:r>
-          <a:r>
-            <a:rPr lang="en-US" sz="2800" kern="1200" dirty="0" smtClean="0"/>
-            <a:t>…) </a:t>
-          </a:r>
-          <a:endParaRPr lang="en-US" sz="2800" kern="1200" dirty="0"/>
-        </a:p>
-        <a:p>
-          <a:pPr marL="285750" lvl="1" indent="-285750" algn="l" defTabSz="1244600">
-            <a:lnSpc>
-              <a:spcPct val="90000"/>
-            </a:lnSpc>
-            <a:spcBef>
-              <a:spcPct val="0"/>
-            </a:spcBef>
-            <a:spcAft>
-              <a:spcPct val="15000"/>
-            </a:spcAft>
-            <a:buChar char="••"/>
-          </a:pPr>
-          <a:r>
-            <a:rPr lang="en-US" sz="2800" kern="1200" dirty="0" smtClean="0"/>
-            <a:t>Store user result (height, weight, spo2, blood pressure, temperature)</a:t>
-          </a:r>
-          <a:endParaRPr lang="en-US" sz="2800" kern="1200" dirty="0"/>
-        </a:p>
-        <a:p>
-          <a:pPr marL="285750" lvl="1" indent="-285750" algn="l" defTabSz="1244600">
-            <a:lnSpc>
-              <a:spcPct val="90000"/>
-            </a:lnSpc>
-            <a:spcBef>
-              <a:spcPct val="0"/>
-            </a:spcBef>
-            <a:spcAft>
-              <a:spcPct val="15000"/>
-            </a:spcAft>
-            <a:buChar char="••"/>
-          </a:pPr>
-          <a:r>
-            <a:rPr lang="en-US" sz="2800" kern="1200" dirty="0" err="1" smtClean="0"/>
-            <a:t>Quang</a:t>
-          </a:r>
-          <a:r>
-            <a:rPr lang="en-US" sz="2800" kern="1200" dirty="0" smtClean="0"/>
-            <a:t> + Ly</a:t>
-          </a:r>
-          <a:endParaRPr lang="en-US" sz="2800" kern="1200" dirty="0"/>
-        </a:p>
-      </dsp:txBody>
-      <dsp:txXfrm>
-        <a:off x="51" y="823098"/>
-        <a:ext cx="4913783" cy="3511541"/>
-      </dsp:txXfrm>
-    </dsp:sp>
-    <dsp:sp modelId="{417FE0C0-F440-47BD-874B-4AAC1FE68571}">
-      <dsp:nvSpPr>
-        <dsp:cNvPr id="0" name=""/>
-        <dsp:cNvSpPr/>
-      </dsp:nvSpPr>
-      <dsp:spPr>
-        <a:xfrm>
-          <a:off x="5601764" y="16698"/>
-          <a:ext cx="4913783" cy="806400"/>
-        </a:xfrm>
-        <a:prstGeom prst="rect">
-          <a:avLst/>
-        </a:prstGeom>
-        <a:solidFill>
-          <a:schemeClr val="accent1">
-            <a:hueOff val="0"/>
-            <a:satOff val="0"/>
-            <a:lumOff val="0"/>
-            <a:alphaOff val="0"/>
-          </a:schemeClr>
-        </a:solidFill>
-        <a:ln w="12700" cap="flat" cmpd="sng" algn="ctr">
-          <a:solidFill>
-            <a:schemeClr val="accent1">
-              <a:hueOff val="0"/>
-              <a:satOff val="0"/>
-              <a:lumOff val="0"/>
-              <a:alphaOff val="0"/>
-            </a:schemeClr>
-          </a:solidFill>
-          <a:prstDash val="solid"/>
-          <a:miter lim="800000"/>
-        </a:ln>
-        <a:effectLst/>
-      </dsp:spPr>
-      <dsp:style>
-        <a:lnRef idx="2">
-          <a:scrgbClr r="0" g="0" b="0"/>
-        </a:lnRef>
-        <a:fillRef idx="1">
-          <a:scrgbClr r="0" g="0" b="0"/>
-        </a:fillRef>
-        <a:effectRef idx="0">
-          <a:scrgbClr r="0" g="0" b="0"/>
-        </a:effectRef>
-        <a:fontRef idx="minor">
-          <a:schemeClr val="lt1"/>
-        </a:fontRef>
-      </dsp:style>
-      <dsp:txBody>
-        <a:bodyPr spcFirstLastPara="0" vert="horz" wrap="square" lIns="199136" tIns="113792" rIns="199136" bIns="113792" numCol="1" spcCol="1270" anchor="ctr" anchorCtr="0">
-          <a:noAutofit/>
-        </a:bodyPr>
-        <a:lstStyle/>
-        <a:p>
-          <a:pPr lvl="0" algn="ctr" defTabSz="1244600">
-            <a:lnSpc>
-              <a:spcPct val="90000"/>
-            </a:lnSpc>
-            <a:spcBef>
-              <a:spcPct val="0"/>
-            </a:spcBef>
-            <a:spcAft>
-              <a:spcPct val="35000"/>
-            </a:spcAft>
-          </a:pPr>
-          <a:r>
-            <a:rPr lang="en-US" sz="2800" kern="1200" dirty="0" smtClean="0"/>
-            <a:t>Android app</a:t>
-          </a:r>
-          <a:endParaRPr lang="en-US" sz="2800" kern="1200" dirty="0"/>
-        </a:p>
-      </dsp:txBody>
-      <dsp:txXfrm>
-        <a:off x="5601764" y="16698"/>
-        <a:ext cx="4913783" cy="806400"/>
-      </dsp:txXfrm>
-    </dsp:sp>
-    <dsp:sp modelId="{ABB216B2-FB80-4CA8-AFB5-B752ADED21DE}">
-      <dsp:nvSpPr>
-        <dsp:cNvPr id="0" name=""/>
-        <dsp:cNvSpPr/>
-      </dsp:nvSpPr>
-      <dsp:spPr>
-        <a:xfrm>
-          <a:off x="5601764" y="823098"/>
-          <a:ext cx="4913783" cy="3511541"/>
-        </a:xfrm>
-        <a:prstGeom prst="rect">
-          <a:avLst/>
-        </a:prstGeom>
-        <a:solidFill>
-          <a:schemeClr val="accent1">
-            <a:alpha val="90000"/>
-            <a:tint val="40000"/>
-            <a:hueOff val="0"/>
-            <a:satOff val="0"/>
-            <a:lumOff val="0"/>
-            <a:alphaOff val="0"/>
-          </a:schemeClr>
-        </a:solidFill>
-        <a:ln w="12700" cap="flat" cmpd="sng" algn="ctr">
-          <a:solidFill>
-            <a:schemeClr val="accent1">
-              <a:alpha val="90000"/>
-              <a:tint val="40000"/>
-              <a:hueOff val="0"/>
-              <a:satOff val="0"/>
-              <a:lumOff val="0"/>
-              <a:alphaOff val="0"/>
-            </a:schemeClr>
-          </a:solidFill>
-          <a:prstDash val="solid"/>
-          <a:miter lim="800000"/>
-        </a:ln>
-        <a:effectLst/>
-      </dsp:spPr>
-      <dsp:style>
-        <a:lnRef idx="2">
-          <a:scrgbClr r="0" g="0" b="0"/>
-        </a:lnRef>
-        <a:fillRef idx="1">
-          <a:scrgbClr r="0" g="0" b="0"/>
-        </a:fillRef>
-        <a:effectRef idx="0">
-          <a:scrgbClr r="0" g="0" b="0"/>
-        </a:effectRef>
-        <a:fontRef idx="minor"/>
-      </dsp:style>
-      <dsp:txBody>
-        <a:bodyPr spcFirstLastPara="0" vert="horz" wrap="square" lIns="149352" tIns="149352" rIns="199136" bIns="224028" numCol="1" spcCol="1270" anchor="t" anchorCtr="0">
-          <a:noAutofit/>
-        </a:bodyPr>
-        <a:lstStyle/>
-        <a:p>
-          <a:pPr marL="285750" lvl="1" indent="-285750" algn="l" defTabSz="1244600">
-            <a:lnSpc>
-              <a:spcPct val="90000"/>
-            </a:lnSpc>
-            <a:spcBef>
-              <a:spcPct val="0"/>
-            </a:spcBef>
-            <a:spcAft>
-              <a:spcPct val="15000"/>
-            </a:spcAft>
-            <a:buChar char="••"/>
-          </a:pPr>
-          <a:r>
-            <a:rPr lang="en-US" sz="2800" kern="1200" dirty="0" smtClean="0"/>
-            <a:t>Bluetooth</a:t>
-          </a:r>
-          <a:endParaRPr lang="en-US" sz="2800" kern="1200" dirty="0"/>
-        </a:p>
-        <a:p>
-          <a:pPr marL="571500" lvl="2" indent="-285750" algn="l" defTabSz="1244600">
-            <a:lnSpc>
-              <a:spcPct val="90000"/>
-            </a:lnSpc>
-            <a:spcBef>
-              <a:spcPct val="0"/>
-            </a:spcBef>
-            <a:spcAft>
-              <a:spcPct val="15000"/>
-            </a:spcAft>
-            <a:buChar char="••"/>
-          </a:pPr>
-          <a:r>
-            <a:rPr lang="en-US" sz="2800" kern="1200" dirty="0" smtClean="0"/>
-            <a:t>See above Bluetooth slide</a:t>
-          </a:r>
-          <a:endParaRPr lang="en-US" sz="2800" kern="1200" dirty="0"/>
-        </a:p>
-        <a:p>
-          <a:pPr marL="571500" lvl="2" indent="-285750" algn="l" defTabSz="1244600">
-            <a:lnSpc>
-              <a:spcPct val="90000"/>
-            </a:lnSpc>
-            <a:spcBef>
-              <a:spcPct val="0"/>
-            </a:spcBef>
-            <a:spcAft>
-              <a:spcPct val="15000"/>
-            </a:spcAft>
-            <a:buChar char="••"/>
-          </a:pPr>
-          <a:r>
-            <a:rPr lang="en-US" sz="2800" kern="1200" dirty="0" smtClean="0"/>
-            <a:t>Chung</a:t>
-          </a:r>
-          <a:endParaRPr lang="en-US" sz="2800" kern="1200" dirty="0"/>
-        </a:p>
-        <a:p>
-          <a:pPr marL="285750" lvl="1" indent="-285750" algn="l" defTabSz="1244600">
-            <a:lnSpc>
-              <a:spcPct val="90000"/>
-            </a:lnSpc>
-            <a:spcBef>
-              <a:spcPct val="0"/>
-            </a:spcBef>
-            <a:spcAft>
-              <a:spcPct val="15000"/>
-            </a:spcAft>
-            <a:buChar char="••"/>
-          </a:pPr>
-          <a:r>
-            <a:rPr lang="en-US" sz="2800" kern="1200" dirty="0" smtClean="0"/>
-            <a:t>User profile</a:t>
-          </a:r>
-          <a:endParaRPr lang="en-US" sz="2800" kern="1200" dirty="0"/>
-        </a:p>
-        <a:p>
-          <a:pPr marL="571500" lvl="2" indent="-285750" algn="l" defTabSz="1244600">
-            <a:lnSpc>
-              <a:spcPct val="90000"/>
-            </a:lnSpc>
-            <a:spcBef>
-              <a:spcPct val="0"/>
-            </a:spcBef>
-            <a:spcAft>
-              <a:spcPct val="15000"/>
-            </a:spcAft>
-            <a:buChar char="••"/>
-          </a:pPr>
-          <a:r>
-            <a:rPr lang="en-US" sz="2800" kern="1200" dirty="0" smtClean="0"/>
-            <a:t>Ask mentor </a:t>
-          </a:r>
-          <a:r>
-            <a:rPr lang="en-US" sz="2800" kern="1200" dirty="0" smtClean="0"/>
-            <a:t>&amp; server team for </a:t>
-          </a:r>
-          <a:r>
-            <a:rPr lang="en-US" sz="2800" kern="1200" dirty="0" smtClean="0"/>
-            <a:t>more information </a:t>
-          </a:r>
-          <a:r>
-            <a:rPr lang="en-US" sz="2800" kern="1200" dirty="0" smtClean="0">
-              <a:sym typeface="Wingdings" panose="05000000000000000000" pitchFamily="2" charset="2"/>
-            </a:rPr>
-            <a:t>)</a:t>
-          </a:r>
-          <a:endParaRPr lang="en-US" sz="2800" kern="1200" dirty="0"/>
-        </a:p>
-        <a:p>
-          <a:pPr marL="571500" lvl="2" indent="-285750" algn="l" defTabSz="1244600">
-            <a:lnSpc>
-              <a:spcPct val="90000"/>
-            </a:lnSpc>
-            <a:spcBef>
-              <a:spcPct val="0"/>
-            </a:spcBef>
-            <a:spcAft>
-              <a:spcPct val="15000"/>
-            </a:spcAft>
-            <a:buChar char="••"/>
-          </a:pPr>
-          <a:r>
-            <a:rPr lang="en-US" sz="2800" kern="1200" dirty="0" err="1" smtClean="0"/>
-            <a:t>Thành</a:t>
-          </a:r>
-          <a:endParaRPr lang="en-US" sz="2800" kern="1200" dirty="0"/>
-        </a:p>
-      </dsp:txBody>
-      <dsp:txXfrm>
-        <a:off x="5601764" y="823098"/>
-        <a:ext cx="4913783" cy="3511541"/>
-      </dsp:txXfrm>
-    </dsp:sp>
   </dsp:spTree>
 </dsp:drawing>
 </file>
@@ -18424,7 +17810,7 @@
           <a:p>
             <a:fld id="{CA829DC8-727A-4F53-801F-7AA35DEAE48C}" type="datetimeFigureOut">
               <a:rPr lang="en-US" smtClean="0"/>
-              <a:t>3/19/2017</a:t>
+              <a:t>3/20/2017</a:t>
             </a:fld>
             <a:endParaRPr lang="en-US"/>
           </a:p>
@@ -18907,7 +18293,7 @@
           <a:p>
             <a:fld id="{198B743D-DE9C-4F5D-849D-2789155D27D5}" type="datetimeFigureOut">
               <a:rPr lang="en-US" smtClean="0"/>
-              <a:t>3/19/2017</a:t>
+              <a:t>3/20/2017</a:t>
             </a:fld>
             <a:endParaRPr lang="en-US"/>
           </a:p>
@@ -19077,7 +18463,7 @@
           <a:p>
             <a:fld id="{198B743D-DE9C-4F5D-849D-2789155D27D5}" type="datetimeFigureOut">
               <a:rPr lang="en-US" smtClean="0"/>
-              <a:t>3/19/2017</a:t>
+              <a:t>3/20/2017</a:t>
             </a:fld>
             <a:endParaRPr lang="en-US"/>
           </a:p>
@@ -19257,7 +18643,7 @@
           <a:p>
             <a:fld id="{198B743D-DE9C-4F5D-849D-2789155D27D5}" type="datetimeFigureOut">
               <a:rPr lang="en-US" smtClean="0"/>
-              <a:t>3/19/2017</a:t>
+              <a:t>3/20/2017</a:t>
             </a:fld>
             <a:endParaRPr lang="en-US"/>
           </a:p>
@@ -19427,7 +18813,7 @@
           <a:p>
             <a:fld id="{198B743D-DE9C-4F5D-849D-2789155D27D5}" type="datetimeFigureOut">
               <a:rPr lang="en-US" smtClean="0"/>
-              <a:t>3/19/2017</a:t>
+              <a:t>3/20/2017</a:t>
             </a:fld>
             <a:endParaRPr lang="en-US"/>
           </a:p>
@@ -19673,7 +19059,7 @@
           <a:p>
             <a:fld id="{198B743D-DE9C-4F5D-849D-2789155D27D5}" type="datetimeFigureOut">
               <a:rPr lang="en-US" smtClean="0"/>
-              <a:t>3/19/2017</a:t>
+              <a:t>3/20/2017</a:t>
             </a:fld>
             <a:endParaRPr lang="en-US"/>
           </a:p>
@@ -19905,7 +19291,7 @@
           <a:p>
             <a:fld id="{198B743D-DE9C-4F5D-849D-2789155D27D5}" type="datetimeFigureOut">
               <a:rPr lang="en-US" smtClean="0"/>
-              <a:t>3/19/2017</a:t>
+              <a:t>3/20/2017</a:t>
             </a:fld>
             <a:endParaRPr lang="en-US"/>
           </a:p>
@@ -20272,7 +19658,7 @@
           <a:p>
             <a:fld id="{198B743D-DE9C-4F5D-849D-2789155D27D5}" type="datetimeFigureOut">
               <a:rPr lang="en-US" smtClean="0"/>
-              <a:t>3/19/2017</a:t>
+              <a:t>3/20/2017</a:t>
             </a:fld>
             <a:endParaRPr lang="en-US"/>
           </a:p>
@@ -20390,7 +19776,7 @@
           <a:p>
             <a:fld id="{198B743D-DE9C-4F5D-849D-2789155D27D5}" type="datetimeFigureOut">
               <a:rPr lang="en-US" smtClean="0"/>
-              <a:t>3/19/2017</a:t>
+              <a:t>3/20/2017</a:t>
             </a:fld>
             <a:endParaRPr lang="en-US"/>
           </a:p>
@@ -20485,7 +19871,7 @@
           <a:p>
             <a:fld id="{198B743D-DE9C-4F5D-849D-2789155D27D5}" type="datetimeFigureOut">
               <a:rPr lang="en-US" smtClean="0"/>
-              <a:t>3/19/2017</a:t>
+              <a:t>3/20/2017</a:t>
             </a:fld>
             <a:endParaRPr lang="en-US"/>
           </a:p>
@@ -20762,7 +20148,7 @@
           <a:p>
             <a:fld id="{198B743D-DE9C-4F5D-849D-2789155D27D5}" type="datetimeFigureOut">
               <a:rPr lang="en-US" smtClean="0"/>
-              <a:t>3/19/2017</a:t>
+              <a:t>3/20/2017</a:t>
             </a:fld>
             <a:endParaRPr lang="en-US"/>
           </a:p>
@@ -21015,7 +20401,7 @@
           <a:p>
             <a:fld id="{198B743D-DE9C-4F5D-849D-2789155D27D5}" type="datetimeFigureOut">
               <a:rPr lang="en-US" smtClean="0"/>
-              <a:t>3/19/2017</a:t>
+              <a:t>3/20/2017</a:t>
             </a:fld>
             <a:endParaRPr lang="en-US"/>
           </a:p>
@@ -21228,7 +20614,7 @@
           <a:p>
             <a:fld id="{198B743D-DE9C-4F5D-849D-2789155D27D5}" type="datetimeFigureOut">
               <a:rPr lang="en-US" smtClean="0"/>
-              <a:t>3/19/2017</a:t>
+              <a:t>3/20/2017</a:t>
             </a:fld>
             <a:endParaRPr lang="en-US"/>
           </a:p>
@@ -21709,11 +21095,7 @@
             </a:pPr>
             <a:r>
               <a:rPr lang="en-US" dirty="0" smtClean="0"/>
-              <a:t>Defines desired features, desired output for each </a:t>
-            </a:r>
-            <a:r>
-              <a:rPr lang="en-US" dirty="0" smtClean="0"/>
-              <a:t>module</a:t>
+              <a:t>Defines desired features, desired output for each module</a:t>
             </a:r>
           </a:p>
           <a:p>
@@ -21725,7 +21107,6 @@
               <a:rPr lang="en-US" dirty="0" smtClean="0"/>
               <a:t>Module code</a:t>
             </a:r>
-            <a:endParaRPr lang="en-US" dirty="0" smtClean="0"/>
           </a:p>
           <a:p>
             <a:pPr lvl="1" algn="r"/>
@@ -22419,7 +21800,6 @@
               <a:rPr lang="en-US" dirty="0" smtClean="0"/>
               <a:t>File: spo2_result, spo2_finish</a:t>
             </a:r>
-            <a:endParaRPr lang="en-US" dirty="0" smtClean="0"/>
           </a:p>
           <a:p>
             <a:pPr lvl="1"/>
@@ -22731,11 +22111,7 @@
             </a:r>
             <a:r>
               <a:rPr lang="en-US" dirty="0" smtClean="0"/>
-              <a:t> </a:t>
-            </a:r>
-            <a:r>
-              <a:rPr lang="en-US" dirty="0" smtClean="0"/>
-              <a:t>+ </a:t>
+              <a:t> + </a:t>
             </a:r>
             <a:r>
               <a:rPr lang="en-US" dirty="0" err="1" smtClean="0"/>
@@ -24028,11 +23404,7 @@
             </a:r>
             <a:r>
               <a:rPr lang="en-US" dirty="0" smtClean="0"/>
-              <a:t>&gt;(arg1</a:t>
-            </a:r>
-            <a:r>
-              <a:rPr lang="en-US" dirty="0" smtClean="0"/>
-              <a:t>, arg2…)</a:t>
+              <a:t>&gt;(arg1, arg2…)</a:t>
             </a:r>
           </a:p>
           <a:p>
@@ -24134,7 +23506,6 @@
               <a:rPr lang="en-US" dirty="0"/>
               <a:t>General rules</a:t>
             </a:r>
-            <a:endParaRPr lang="en-US" dirty="0"/>
           </a:p>
         </p:txBody>
       </p:sp>
@@ -24196,29 +23567,13 @@
           <a:p>
             <a:r>
               <a:rPr lang="en-US" dirty="0" smtClean="0"/>
-              <a:t>Other modules can be written in any </a:t>
-            </a:r>
-            <a:r>
-              <a:rPr lang="en-US" dirty="0" smtClean="0"/>
-              <a:t>language, </a:t>
-            </a:r>
-            <a:r>
-              <a:rPr lang="en-US" dirty="0" smtClean="0"/>
-              <a:t>the output of each module is an executable </a:t>
-            </a:r>
-            <a:r>
-              <a:rPr lang="en-US" dirty="0" smtClean="0"/>
-              <a:t>file and some file used for communication</a:t>
+              <a:t>Other modules can be written in any language, the output of each module is an executable file and some file used for communication</a:t>
             </a:r>
           </a:p>
           <a:p>
             <a:r>
               <a:rPr lang="en-US" dirty="0" smtClean="0"/>
-              <a:t>inter-process </a:t>
-            </a:r>
-            <a:r>
-              <a:rPr lang="en-US" dirty="0" smtClean="0"/>
-              <a:t>communication: via files</a:t>
+              <a:t>inter-process communication: via files</a:t>
             </a:r>
           </a:p>
         </p:txBody>
@@ -24286,7 +23641,7 @@
             <p:ph idx="1"/>
             <p:extLst>
               <p:ext uri="{D42A27DB-BD31-4B8C-83A1-F6EECF244321}">
-                <p14:modId xmlns:p14="http://schemas.microsoft.com/office/powerpoint/2010/main" val="1069004261"/>
+                <p14:modId xmlns:p14="http://schemas.microsoft.com/office/powerpoint/2010/main" val="1063619378"/>
               </p:ext>
             </p:extLst>
           </p:nvPr>
@@ -24309,8 +23664,8 @@
         </p:nvSpPr>
         <p:spPr>
           <a:xfrm>
-            <a:off x="5497285" y="3931730"/>
-            <a:ext cx="724878" cy="738664"/>
+            <a:off x="5568847" y="3927564"/>
+            <a:ext cx="724878" cy="954107"/>
           </a:xfrm>
           <a:prstGeom prst="rect">
             <a:avLst/>
@@ -24322,6 +23677,12 @@
             <a:spAutoFit/>
           </a:bodyPr>
           <a:lstStyle/>
+          <a:p>
+            <a:r>
+              <a:rPr lang="en-US" sz="1400" dirty="0" smtClean="0"/>
+              <a:t>Uno</a:t>
+            </a:r>
+          </a:p>
           <a:p>
             <a:r>
               <a:rPr lang="en-US" sz="1400" dirty="0" smtClean="0"/>
@@ -24585,13 +23946,8 @@
             <a:pPr lvl="1"/>
             <a:r>
               <a:rPr lang="en-US" dirty="0" smtClean="0"/>
-              <a:t>Program: main.py, main_class</a:t>
-            </a:r>
-            <a:r>
-              <a:rPr lang="en-US" dirty="0" smtClean="0"/>
-              <a:t>.py (header file)</a:t>
-            </a:r>
-            <a:endParaRPr lang="en-US" dirty="0" smtClean="0"/>
+              <a:t>Program: main.py, main_class.py (header file)</a:t>
+            </a:r>
           </a:p>
         </p:txBody>
       </p:sp>
@@ -24669,11 +24025,7 @@
             </a:r>
             <a:r>
               <a:rPr lang="en-US" dirty="0" smtClean="0"/>
-              <a:t> </a:t>
-            </a:r>
-            <a:r>
-              <a:rPr lang="en-US" dirty="0" smtClean="0"/>
-              <a:t>Vu &gt;&gt; This module will be implemented in python</a:t>
+              <a:t> Vu &gt;&gt; This module will be implemented in python</a:t>
             </a:r>
           </a:p>
           <a:p>
@@ -24688,7 +24040,6 @@
               <a:rPr lang="en-US" dirty="0" smtClean="0"/>
               <a:t>Input: some mp3 files</a:t>
             </a:r>
-            <a:endParaRPr lang="en-US" dirty="0" smtClean="0"/>
           </a:p>
           <a:p>
             <a:pPr lvl="1"/>
@@ -24951,7 +24302,6 @@
               <a:rPr lang="en-US" dirty="0" smtClean="0"/>
               <a:t>Initialize and control the hand-placing platform </a:t>
             </a:r>
-            <a:endParaRPr lang="en-US" dirty="0" smtClean="0"/>
           </a:p>
           <a:p>
             <a:pPr lvl="1"/>

</xml_diff>